<commit_message>
Adding slide about annointing as king
</commit_message>
<xml_diff>
--- a/baptismclass/Baptism.pptx
+++ b/baptismclass/Baptism.pptx
@@ -5,7 +5,7 @@
     <p:sldMasterId id="2147483648" r:id="rId1"/>
   </p:sldMasterIdLst>
   <p:notesMasterIdLst>
-    <p:notesMasterId r:id="rId47"/>
+    <p:notesMasterId r:id="rId48"/>
   </p:notesMasterIdLst>
   <p:sldIdLst>
     <p:sldId id="256" r:id="rId2"/>
@@ -41,18 +41,19 @@
     <p:sldId id="276" r:id="rId32"/>
     <p:sldId id="300" r:id="rId33"/>
     <p:sldId id="301" r:id="rId34"/>
-    <p:sldId id="277" r:id="rId35"/>
-    <p:sldId id="278" r:id="rId36"/>
-    <p:sldId id="279" r:id="rId37"/>
-    <p:sldId id="280" r:id="rId38"/>
-    <p:sldId id="289" r:id="rId39"/>
-    <p:sldId id="290" r:id="rId40"/>
-    <p:sldId id="281" r:id="rId41"/>
-    <p:sldId id="282" r:id="rId42"/>
-    <p:sldId id="283" r:id="rId43"/>
-    <p:sldId id="284" r:id="rId44"/>
-    <p:sldId id="285" r:id="rId45"/>
-    <p:sldId id="288" r:id="rId46"/>
+    <p:sldId id="302" r:id="rId35"/>
+    <p:sldId id="277" r:id="rId36"/>
+    <p:sldId id="278" r:id="rId37"/>
+    <p:sldId id="279" r:id="rId38"/>
+    <p:sldId id="280" r:id="rId39"/>
+    <p:sldId id="289" r:id="rId40"/>
+    <p:sldId id="290" r:id="rId41"/>
+    <p:sldId id="281" r:id="rId42"/>
+    <p:sldId id="282" r:id="rId43"/>
+    <p:sldId id="283" r:id="rId44"/>
+    <p:sldId id="284" r:id="rId45"/>
+    <p:sldId id="285" r:id="rId46"/>
+    <p:sldId id="288" r:id="rId47"/>
   </p:sldIdLst>
   <p:sldSz cx="9144000" cy="6858000" type="screen4x3"/>
   <p:notesSz cx="6858000" cy="9144000"/>
@@ -237,7 +238,7 @@
             <a:fld id="{7946C2C9-FAA8-4628-B554-BFB35601F267}" type="datetimeFigureOut">
               <a:rPr lang="en-US" smtClean="0"/>
               <a:pPr/>
-              <a:t>4/30/2010</a:t>
+              <a:t>6/4/2010</a:t>
             </a:fld>
             <a:endParaRPr lang="en-US"/>
           </a:p>
@@ -3027,7 +3028,7 @@
             <a:fld id="{8C901EA7-7F66-4094-8828-5627624E924D}" type="slidenum">
               <a:rPr lang="en-US" smtClean="0"/>
               <a:pPr/>
-              <a:t>35</a:t>
+              <a:t>36</a:t>
             </a:fld>
             <a:endParaRPr lang="en-US"/>
           </a:p>
@@ -3155,7 +3156,7 @@
             <a:fld id="{8C901EA7-7F66-4094-8828-5627624E924D}" type="slidenum">
               <a:rPr lang="en-US" smtClean="0"/>
               <a:pPr/>
-              <a:t>36</a:t>
+              <a:t>37</a:t>
             </a:fld>
             <a:endParaRPr lang="en-US"/>
           </a:p>
@@ -3351,7 +3352,7 @@
             <a:fld id="{3A77AE25-6417-4A59-87AC-F0222D2B0C99}" type="datetimeFigureOut">
               <a:rPr lang="en-US" smtClean="0"/>
               <a:pPr/>
-              <a:t>4/30/2010</a:t>
+              <a:t>6/4/2010</a:t>
             </a:fld>
             <a:endParaRPr lang="en-US"/>
           </a:p>
@@ -3518,7 +3519,7 @@
             <a:fld id="{3A77AE25-6417-4A59-87AC-F0222D2B0C99}" type="datetimeFigureOut">
               <a:rPr lang="en-US" smtClean="0"/>
               <a:pPr/>
-              <a:t>4/30/2010</a:t>
+              <a:t>6/4/2010</a:t>
             </a:fld>
             <a:endParaRPr lang="en-US"/>
           </a:p>
@@ -3695,7 +3696,7 @@
             <a:fld id="{3A77AE25-6417-4A59-87AC-F0222D2B0C99}" type="datetimeFigureOut">
               <a:rPr lang="en-US" smtClean="0"/>
               <a:pPr/>
-              <a:t>4/30/2010</a:t>
+              <a:t>6/4/2010</a:t>
             </a:fld>
             <a:endParaRPr lang="en-US"/>
           </a:p>
@@ -3862,7 +3863,7 @@
             <a:fld id="{3A77AE25-6417-4A59-87AC-F0222D2B0C99}" type="datetimeFigureOut">
               <a:rPr lang="en-US" smtClean="0"/>
               <a:pPr/>
-              <a:t>4/30/2010</a:t>
+              <a:t>6/4/2010</a:t>
             </a:fld>
             <a:endParaRPr lang="en-US"/>
           </a:p>
@@ -4105,7 +4106,7 @@
             <a:fld id="{3A77AE25-6417-4A59-87AC-F0222D2B0C99}" type="datetimeFigureOut">
               <a:rPr lang="en-US" smtClean="0"/>
               <a:pPr/>
-              <a:t>4/30/2010</a:t>
+              <a:t>6/4/2010</a:t>
             </a:fld>
             <a:endParaRPr lang="en-US"/>
           </a:p>
@@ -4390,7 +4391,7 @@
             <a:fld id="{3A77AE25-6417-4A59-87AC-F0222D2B0C99}" type="datetimeFigureOut">
               <a:rPr lang="en-US" smtClean="0"/>
               <a:pPr/>
-              <a:t>4/30/2010</a:t>
+              <a:t>6/4/2010</a:t>
             </a:fld>
             <a:endParaRPr lang="en-US"/>
           </a:p>
@@ -4809,7 +4810,7 @@
             <a:fld id="{3A77AE25-6417-4A59-87AC-F0222D2B0C99}" type="datetimeFigureOut">
               <a:rPr lang="en-US" smtClean="0"/>
               <a:pPr/>
-              <a:t>4/30/2010</a:t>
+              <a:t>6/4/2010</a:t>
             </a:fld>
             <a:endParaRPr lang="en-US"/>
           </a:p>
@@ -4924,7 +4925,7 @@
             <a:fld id="{3A77AE25-6417-4A59-87AC-F0222D2B0C99}" type="datetimeFigureOut">
               <a:rPr lang="en-US" smtClean="0"/>
               <a:pPr/>
-              <a:t>4/30/2010</a:t>
+              <a:t>6/4/2010</a:t>
             </a:fld>
             <a:endParaRPr lang="en-US"/>
           </a:p>
@@ -5016,7 +5017,7 @@
             <a:fld id="{3A77AE25-6417-4A59-87AC-F0222D2B0C99}" type="datetimeFigureOut">
               <a:rPr lang="en-US" smtClean="0"/>
               <a:pPr/>
-              <a:t>4/30/2010</a:t>
+              <a:t>6/4/2010</a:t>
             </a:fld>
             <a:endParaRPr lang="en-US"/>
           </a:p>
@@ -5290,7 +5291,7 @@
             <a:fld id="{3A77AE25-6417-4A59-87AC-F0222D2B0C99}" type="datetimeFigureOut">
               <a:rPr lang="en-US" smtClean="0"/>
               <a:pPr/>
-              <a:t>4/30/2010</a:t>
+              <a:t>6/4/2010</a:t>
             </a:fld>
             <a:endParaRPr lang="en-US"/>
           </a:p>
@@ -5540,7 +5541,7 @@
             <a:fld id="{3A77AE25-6417-4A59-87AC-F0222D2B0C99}" type="datetimeFigureOut">
               <a:rPr lang="en-US" smtClean="0"/>
               <a:pPr/>
-              <a:t>4/30/2010</a:t>
+              <a:t>6/4/2010</a:t>
             </a:fld>
             <a:endParaRPr lang="en-US"/>
           </a:p>
@@ -5750,7 +5751,7 @@
             <a:fld id="{3A77AE25-6417-4A59-87AC-F0222D2B0C99}" type="datetimeFigureOut">
               <a:rPr lang="en-US" smtClean="0"/>
               <a:pPr/>
-              <a:t>4/30/2010</a:t>
+              <a:t>6/4/2010</a:t>
             </a:fld>
             <a:endParaRPr lang="en-US"/>
           </a:p>
@@ -8702,7 +8703,11 @@
           <a:p>
             <a:r>
               <a:rPr lang="en-US" dirty="0" smtClean="0"/>
-              <a:t>Clothing of the White Garment</a:t>
+              <a:t>Anointing: </a:t>
+            </a:r>
+            <a:r>
+              <a:rPr lang="en-US" dirty="0" smtClean="0"/>
+              <a:t>King</a:t>
             </a:r>
             <a:endParaRPr lang="en-US" dirty="0"/>
           </a:p>
@@ -8725,13 +8730,25 @@
           <a:p>
             <a:r>
               <a:rPr lang="en-US" dirty="0" smtClean="0"/>
-              <a:t>“put on Christ”</a:t>
-            </a:r>
-          </a:p>
-          <a:p>
-            <a:r>
-              <a:rPr lang="en-US" dirty="0" smtClean="0"/>
-              <a:t>Risen with Christ</a:t>
+              <a:t>Covenant in sharing in Christ’s kingdom</a:t>
+            </a:r>
+          </a:p>
+          <a:p>
+            <a:r>
+              <a:rPr lang="en-US" dirty="0" smtClean="0"/>
+              <a:t>Members of the new Kingdom of Israel (the Church)</a:t>
+            </a:r>
+          </a:p>
+          <a:p>
+            <a:r>
+              <a:rPr lang="en-US" dirty="0" smtClean="0"/>
+              <a:t>Grow and tend the Kingdom on Earth, prepare for the Kingdom of Heaven</a:t>
+            </a:r>
+          </a:p>
+          <a:p>
+            <a:r>
+              <a:rPr lang="en-US" dirty="0" smtClean="0"/>
+              <a:t>Rule through service, reign through obedience, Conquer through love</a:t>
             </a:r>
             <a:endParaRPr lang="en-US" dirty="0"/>
           </a:p>
@@ -8781,14 +8798,12 @@
         </p:nvSpPr>
         <p:spPr/>
         <p:txBody>
-          <a:bodyPr>
-            <a:normAutofit fontScale="90000"/>
-          </a:bodyPr>
-          <a:lstStyle/>
-          <a:p>
-            <a:r>
-              <a:rPr lang="en-US" dirty="0" smtClean="0"/>
-              <a:t>Lighting of Candle from Easter Candle</a:t>
+          <a:bodyPr/>
+          <a:lstStyle/>
+          <a:p>
+            <a:r>
+              <a:rPr lang="en-US" dirty="0" smtClean="0"/>
+              <a:t>Clothing of the White Garment</a:t>
             </a:r>
             <a:endParaRPr lang="en-US" dirty="0"/>
           </a:p>
@@ -8811,13 +8826,13 @@
           <a:p>
             <a:r>
               <a:rPr lang="en-US" dirty="0" smtClean="0"/>
-              <a:t>Light of Christ in the world</a:t>
-            </a:r>
-          </a:p>
-          <a:p>
-            <a:r>
-              <a:rPr lang="en-US" dirty="0" smtClean="0"/>
-              <a:t>Enlightenment of soul and mind</a:t>
+              <a:t>“put on Christ”</a:t>
+            </a:r>
+          </a:p>
+          <a:p>
+            <a:r>
+              <a:rPr lang="en-US" dirty="0" smtClean="0"/>
+              <a:t>Risen with Christ</a:t>
             </a:r>
             <a:endParaRPr lang="en-US" dirty="0"/>
           </a:p>
@@ -8867,12 +8882,14 @@
         </p:nvSpPr>
         <p:spPr/>
         <p:txBody>
-          <a:bodyPr/>
-          <a:lstStyle/>
-          <a:p>
-            <a:r>
-              <a:rPr lang="en-US" dirty="0" err="1" smtClean="0"/>
-              <a:t>Ephphetha</a:t>
+          <a:bodyPr>
+            <a:normAutofit fontScale="90000"/>
+          </a:bodyPr>
+          <a:lstStyle/>
+          <a:p>
+            <a:r>
+              <a:rPr lang="en-US" dirty="0" smtClean="0"/>
+              <a:t>Lighting of Candle from Easter Candle</a:t>
             </a:r>
             <a:endParaRPr lang="en-US" dirty="0"/>
           </a:p>
@@ -8895,35 +8912,14 @@
           <a:p>
             <a:r>
               <a:rPr lang="en-US" dirty="0" smtClean="0"/>
-              <a:t>Can now hear and proclaim the Word of God</a:t>
-            </a:r>
-          </a:p>
-          <a:p>
-            <a:r>
-              <a:rPr lang="en-US" dirty="0" smtClean="0"/>
-              <a:t>Isaiah 35:4-6: “Then will the eyes of the blind be opened, the ears of the deaf be cleared”</a:t>
-            </a:r>
-          </a:p>
-          <a:p>
-            <a:r>
-              <a:rPr lang="en-US" dirty="0" smtClean="0"/>
-              <a:t>Mark 7:33-5:  “[Jesus] said to him, ‘</a:t>
-            </a:r>
-            <a:r>
-              <a:rPr lang="en-US" dirty="0" err="1" smtClean="0"/>
-              <a:t>Ephphetha</a:t>
-            </a:r>
-            <a:r>
-              <a:rPr lang="en-US" dirty="0" smtClean="0"/>
-              <a:t>!’ (that is, ‘Be opened!’) And (immediately) the man's ears were opened, his speech impediment was removed, and he spoke </a:t>
-            </a:r>
-            <a:r>
-              <a:rPr lang="en-US" smtClean="0"/>
-              <a:t>plainly.”</a:t>
-            </a:r>
-            <a:endParaRPr lang="en-US" dirty="0" smtClean="0"/>
-          </a:p>
-          <a:p>
+              <a:t>Light of Christ in the world</a:t>
+            </a:r>
+          </a:p>
+          <a:p>
+            <a:r>
+              <a:rPr lang="en-US" dirty="0" smtClean="0"/>
+              <a:t>Enlightenment of soul and mind</a:t>
+            </a:r>
             <a:endParaRPr lang="en-US" dirty="0"/>
           </a:p>
         </p:txBody>
@@ -8976,8 +8972,8 @@
           <a:lstStyle/>
           <a:p>
             <a:r>
-              <a:rPr lang="en-US" dirty="0" smtClean="0"/>
-              <a:t>Conclusion, Prayer, Final Blessing</a:t>
+              <a:rPr lang="en-US" dirty="0" err="1" smtClean="0"/>
+              <a:t>Ephphetha</a:t>
             </a:r>
             <a:endParaRPr lang="en-US" dirty="0"/>
           </a:p>
@@ -9000,22 +8996,35 @@
           <a:p>
             <a:r>
               <a:rPr lang="en-US" dirty="0" smtClean="0"/>
-              <a:t>Now, in the only Son, a child of God entitled to pray the </a:t>
-            </a:r>
-            <a:r>
-              <a:rPr lang="en-US" dirty="0" smtClean="0"/>
-              <a:t>prayer </a:t>
-            </a:r>
-            <a:r>
-              <a:rPr lang="en-US" dirty="0" smtClean="0"/>
-              <a:t>of the children of God: Our Father.</a:t>
-            </a:r>
-          </a:p>
-          <a:p>
-            <a:r>
-              <a:rPr lang="en-US" dirty="0" smtClean="0"/>
-              <a:t>Last pleas to Christ, the Blessed Mother, and all the Saints to watch over and guide this child and all of us into holy, Christ-like lives</a:t>
-            </a:r>
+              <a:t>Can now hear and proclaim the Word of God</a:t>
+            </a:r>
+          </a:p>
+          <a:p>
+            <a:r>
+              <a:rPr lang="en-US" dirty="0" smtClean="0"/>
+              <a:t>Isaiah 35:4-6: “Then will the eyes of the blind be opened, the ears of the deaf be cleared”</a:t>
+            </a:r>
+          </a:p>
+          <a:p>
+            <a:r>
+              <a:rPr lang="en-US" dirty="0" smtClean="0"/>
+              <a:t>Mark 7:33-5:  “[Jesus] said to him, ‘</a:t>
+            </a:r>
+            <a:r>
+              <a:rPr lang="en-US" dirty="0" err="1" smtClean="0"/>
+              <a:t>Ephphetha</a:t>
+            </a:r>
+            <a:r>
+              <a:rPr lang="en-US" dirty="0" smtClean="0"/>
+              <a:t>!’ (that is, ‘Be opened!’) And (immediately) the man's ears were opened, his speech impediment was removed, and he spoke </a:t>
+            </a:r>
+            <a:r>
+              <a:rPr lang="en-US" smtClean="0"/>
+              <a:t>plainly.”</a:t>
+            </a:r>
+            <a:endParaRPr lang="en-US" dirty="0" smtClean="0"/>
+          </a:p>
+          <a:p>
             <a:endParaRPr lang="en-US" dirty="0"/>
           </a:p>
         </p:txBody>
@@ -9069,7 +9078,7 @@
           <a:p>
             <a:r>
               <a:rPr lang="en-US" dirty="0" smtClean="0"/>
-              <a:t>VIDEO</a:t>
+              <a:t>Conclusion, Prayer, Final Blessing</a:t>
             </a:r>
             <a:endParaRPr lang="en-US" dirty="0"/>
           </a:p>
@@ -9077,20 +9086,30 @@
       </p:sp>
       <p:sp>
         <p:nvSpPr>
-          <p:cNvPr id="3" name="Text Placeholder 2"/>
-          <p:cNvSpPr>
-            <a:spLocks noGrp="1"/>
-          </p:cNvSpPr>
-          <p:nvPr>
-            <p:ph type="body" idx="1"/>
-          </p:nvPr>
-        </p:nvSpPr>
-        <p:spPr/>
-        <p:txBody>
-          <a:bodyPr/>
-          <a:lstStyle/>
-          <a:p>
-            <a:endParaRPr lang="en-US"/>
+          <p:cNvPr id="3" name="Content Placeholder 2"/>
+          <p:cNvSpPr>
+            <a:spLocks noGrp="1"/>
+          </p:cNvSpPr>
+          <p:nvPr>
+            <p:ph idx="1"/>
+          </p:nvPr>
+        </p:nvSpPr>
+        <p:spPr/>
+        <p:txBody>
+          <a:bodyPr/>
+          <a:lstStyle/>
+          <a:p>
+            <a:r>
+              <a:rPr lang="en-US" dirty="0" smtClean="0"/>
+              <a:t>Now, in the only Son, a child of God entitled to pray the prayer of the children of God: Our Father.</a:t>
+            </a:r>
+          </a:p>
+          <a:p>
+            <a:r>
+              <a:rPr lang="en-US" dirty="0" smtClean="0"/>
+              <a:t>Last pleas to Christ, the Blessed Mother, and all the Saints to watch over and guide this child and all of us into holy, Christ-like lives</a:t>
+            </a:r>
+            <a:endParaRPr lang="en-US" dirty="0"/>
           </a:p>
         </p:txBody>
       </p:sp>
@@ -9143,7 +9162,7 @@
           <a:p>
             <a:r>
               <a:rPr lang="en-US" dirty="0" smtClean="0"/>
-              <a:t>U.S. Bishop’s Teachings</a:t>
+              <a:t>VIDEO</a:t>
             </a:r>
             <a:endParaRPr lang="en-US" dirty="0"/>
           </a:p>
@@ -9164,11 +9183,7 @@
           <a:bodyPr/>
           <a:lstStyle/>
           <a:p>
-            <a:r>
-              <a:rPr lang="en-US" dirty="0" smtClean="0"/>
-              <a:t>(reading from US Catechism)</a:t>
-            </a:r>
-            <a:endParaRPr lang="en-US" dirty="0"/>
+            <a:endParaRPr lang="en-US"/>
           </a:p>
         </p:txBody>
       </p:sp>
@@ -9280,7 +9295,7 @@
       </p:grpSpPr>
       <p:sp>
         <p:nvSpPr>
-          <p:cNvPr id="4" name="Title 3"/>
+          <p:cNvPr id="2" name="Title 1"/>
           <p:cNvSpPr>
             <a:spLocks noGrp="1"/>
           </p:cNvSpPr>
@@ -9295,7 +9310,7 @@
           <a:p>
             <a:r>
               <a:rPr lang="en-US" dirty="0" smtClean="0"/>
-              <a:t>Other forms of Baptism</a:t>
+              <a:t>U.S. Bishop’s Teachings</a:t>
             </a:r>
             <a:endParaRPr lang="en-US" dirty="0"/>
           </a:p>
@@ -9303,7 +9318,7 @@
       </p:sp>
       <p:sp>
         <p:nvSpPr>
-          <p:cNvPr id="5" name="Text Placeholder 4"/>
+          <p:cNvPr id="3" name="Text Placeholder 2"/>
           <p:cNvSpPr>
             <a:spLocks noGrp="1"/>
           </p:cNvSpPr>
@@ -9316,7 +9331,11 @@
           <a:bodyPr/>
           <a:lstStyle/>
           <a:p>
-            <a:endParaRPr lang="en-US"/>
+            <a:r>
+              <a:rPr lang="en-US" dirty="0" smtClean="0"/>
+              <a:t>(reading from US Catechism)</a:t>
+            </a:r>
+            <a:endParaRPr lang="en-US" dirty="0"/>
           </a:p>
         </p:txBody>
       </p:sp>
@@ -9354,7 +9373,7 @@
       </p:grpSpPr>
       <p:sp>
         <p:nvSpPr>
-          <p:cNvPr id="2" name="Title 1"/>
+          <p:cNvPr id="4" name="Title 3"/>
           <p:cNvSpPr>
             <a:spLocks noGrp="1"/>
           </p:cNvSpPr>
@@ -9369,7 +9388,7 @@
           <a:p>
             <a:r>
               <a:rPr lang="en-US" dirty="0" smtClean="0"/>
-              <a:t>Baptism of Blood</a:t>
+              <a:t>Other forms of Baptism</a:t>
             </a:r>
             <a:endParaRPr lang="en-US" dirty="0"/>
           </a:p>
@@ -9377,12 +9396,12 @@
       </p:sp>
       <p:sp>
         <p:nvSpPr>
-          <p:cNvPr id="3" name="Content Placeholder 2"/>
-          <p:cNvSpPr>
-            <a:spLocks noGrp="1"/>
-          </p:cNvSpPr>
-          <p:nvPr>
-            <p:ph idx="1"/>
+          <p:cNvPr id="5" name="Text Placeholder 4"/>
+          <p:cNvSpPr>
+            <a:spLocks noGrp="1"/>
+          </p:cNvSpPr>
+          <p:nvPr>
+            <p:ph type="body" idx="1"/>
           </p:nvPr>
         </p:nvSpPr>
         <p:spPr/>
@@ -9443,7 +9462,7 @@
           <a:p>
             <a:r>
               <a:rPr lang="en-US" dirty="0" smtClean="0"/>
-              <a:t>Baptism of Desire</a:t>
+              <a:t>Baptism of Blood</a:t>
             </a:r>
             <a:endParaRPr lang="en-US" dirty="0"/>
           </a:p>
@@ -9502,7 +9521,7 @@
       </p:grpSpPr>
       <p:sp>
         <p:nvSpPr>
-          <p:cNvPr id="4" name="Title 3"/>
+          <p:cNvPr id="2" name="Title 1"/>
           <p:cNvSpPr>
             <a:spLocks noGrp="1"/>
           </p:cNvSpPr>
@@ -9517,7 +9536,7 @@
           <a:p>
             <a:r>
               <a:rPr lang="en-US" dirty="0" smtClean="0"/>
-              <a:t>CONCERNING Other FAITH Traditions</a:t>
+              <a:t>Baptism of Desire</a:t>
             </a:r>
             <a:endParaRPr lang="en-US" dirty="0"/>
           </a:p>
@@ -9525,12 +9544,12 @@
       </p:sp>
       <p:sp>
         <p:nvSpPr>
-          <p:cNvPr id="5" name="Text Placeholder 4"/>
-          <p:cNvSpPr>
-            <a:spLocks noGrp="1"/>
-          </p:cNvSpPr>
-          <p:nvPr>
-            <p:ph type="body" idx="1"/>
+          <p:cNvPr id="3" name="Content Placeholder 2"/>
+          <p:cNvSpPr>
+            <a:spLocks noGrp="1"/>
+          </p:cNvSpPr>
+          <p:nvPr>
+            <p:ph idx="1"/>
           </p:nvPr>
         </p:nvSpPr>
         <p:spPr/>
@@ -9576,7 +9595,7 @@
       </p:grpSpPr>
       <p:sp>
         <p:nvSpPr>
-          <p:cNvPr id="2" name="Title 1"/>
+          <p:cNvPr id="4" name="Title 3"/>
           <p:cNvSpPr>
             <a:spLocks noGrp="1"/>
           </p:cNvSpPr>
@@ -9591,7 +9610,7 @@
           <a:p>
             <a:r>
               <a:rPr lang="en-US" dirty="0" smtClean="0"/>
-              <a:t>The Trinitarian Formula</a:t>
+              <a:t>CONCERNING Other FAITH Traditions</a:t>
             </a:r>
             <a:endParaRPr lang="en-US" dirty="0"/>
           </a:p>
@@ -9599,12 +9618,12 @@
       </p:sp>
       <p:sp>
         <p:nvSpPr>
-          <p:cNvPr id="3" name="Content Placeholder 2"/>
-          <p:cNvSpPr>
-            <a:spLocks noGrp="1"/>
-          </p:cNvSpPr>
-          <p:nvPr>
-            <p:ph idx="1"/>
+          <p:cNvPr id="5" name="Text Placeholder 4"/>
+          <p:cNvSpPr>
+            <a:spLocks noGrp="1"/>
+          </p:cNvSpPr>
+          <p:nvPr>
+            <p:ph type="body" idx="1"/>
           </p:nvPr>
         </p:nvSpPr>
         <p:spPr/>
@@ -9665,6 +9684,80 @@
           <a:p>
             <a:r>
               <a:rPr lang="en-US" dirty="0" smtClean="0"/>
+              <a:t>The Trinitarian Formula</a:t>
+            </a:r>
+            <a:endParaRPr lang="en-US" dirty="0"/>
+          </a:p>
+        </p:txBody>
+      </p:sp>
+      <p:sp>
+        <p:nvSpPr>
+          <p:cNvPr id="3" name="Content Placeholder 2"/>
+          <p:cNvSpPr>
+            <a:spLocks noGrp="1"/>
+          </p:cNvSpPr>
+          <p:nvPr>
+            <p:ph idx="1"/>
+          </p:nvPr>
+        </p:nvSpPr>
+        <p:spPr/>
+        <p:txBody>
+          <a:bodyPr/>
+          <a:lstStyle/>
+          <a:p>
+            <a:endParaRPr lang="en-US"/>
+          </a:p>
+        </p:txBody>
+      </p:sp>
+    </p:spTree>
+  </p:cSld>
+  <p:clrMapOvr>
+    <a:masterClrMapping/>
+  </p:clrMapOvr>
+  <p:timing>
+    <p:tnLst>
+      <p:par>
+        <p:cTn id="1" dur="indefinite" restart="never" nodeType="tmRoot"/>
+      </p:par>
+    </p:tnLst>
+  </p:timing>
+</p:sld>
+</file>
+
+<file path=ppt/slides/slide46.xml><?xml version="1.0" encoding="utf-8"?>
+<p:sld xmlns:a="http://schemas.openxmlformats.org/drawingml/2006/main" xmlns:r="http://schemas.openxmlformats.org/officeDocument/2006/relationships" xmlns:p="http://schemas.openxmlformats.org/presentationml/2006/main">
+  <p:cSld>
+    <p:spTree>
+      <p:nvGrpSpPr>
+        <p:cNvPr id="1" name=""/>
+        <p:cNvGrpSpPr/>
+        <p:nvPr/>
+      </p:nvGrpSpPr>
+      <p:grpSpPr>
+        <a:xfrm>
+          <a:off x="0" y="0"/>
+          <a:ext cx="0" cy="0"/>
+          <a:chOff x="0" y="0"/>
+          <a:chExt cx="0" cy="0"/>
+        </a:xfrm>
+      </p:grpSpPr>
+      <p:sp>
+        <p:nvSpPr>
+          <p:cNvPr id="2" name="Title 1"/>
+          <p:cNvSpPr>
+            <a:spLocks noGrp="1"/>
+          </p:cNvSpPr>
+          <p:nvPr>
+            <p:ph type="title"/>
+          </p:nvPr>
+        </p:nvSpPr>
+        <p:spPr/>
+        <p:txBody>
+          <a:bodyPr/>
+          <a:lstStyle/>
+          <a:p>
+            <a:r>
+              <a:rPr lang="en-US" dirty="0" smtClean="0"/>
               <a:t>Pseudo-Christian and non-Christian</a:t>
             </a:r>
             <a:endParaRPr lang="en-US" dirty="0"/>
@@ -10196,11 +10289,7 @@
             <a:pPr lvl="1"/>
             <a:r>
               <a:rPr lang="en-US" dirty="0" smtClean="0"/>
-              <a:t>“Unless a man be born again of water and the Holy Spirit, he can not enter into the kingdom of God</a:t>
-            </a:r>
-            <a:r>
-              <a:rPr lang="en-US" dirty="0" smtClean="0"/>
-              <a:t>.” </a:t>
+              <a:t>“Unless a man be born again of water and the Holy Spirit, he can not enter into the kingdom of God.” </a:t>
             </a:r>
           </a:p>
           <a:p>

</xml_diff>

<commit_message>
Added a few more scripture references, add 'Faith' as requirement of sacrament
</commit_message>
<xml_diff>
--- a/baptismclass/Baptism.pptx
+++ b/baptismclass/Baptism.pptx
@@ -238,7 +238,7 @@
             <a:fld id="{7946C2C9-FAA8-4628-B554-BFB35601F267}" type="datetimeFigureOut">
               <a:rPr lang="en-US" smtClean="0"/>
               <a:pPr/>
-              <a:t>6/4/2010</a:t>
+              <a:t>8/20/2010</a:t>
             </a:fld>
             <a:endParaRPr lang="en-US"/>
           </a:p>
@@ -592,7 +592,148 @@
                 <a:ea typeface="+mn-ea"/>
                 <a:cs typeface="+mn-cs"/>
               </a:rPr>
-              <a:t> 16:15-16.</a:t>
+              <a:t> 16:15-16</a:t>
+            </a:r>
+            <a:r>
+              <a:rPr lang="en-US" sz="1200" b="0" i="0" kern="1200" dirty="0" smtClean="0">
+                <a:solidFill>
+                  <a:schemeClr val="tx1"/>
+                </a:solidFill>
+                <a:latin typeface="+mn-lt"/>
+                <a:ea typeface="+mn-ea"/>
+                <a:cs typeface="+mn-cs"/>
+              </a:rPr>
+              <a:t>.</a:t>
+            </a:r>
+          </a:p>
+          <a:p>
+            <a:r>
+              <a:rPr lang="en-US" sz="1200" b="0" i="0" kern="1200" dirty="0" smtClean="0">
+                <a:solidFill>
+                  <a:schemeClr val="tx1"/>
+                </a:solidFill>
+                <a:latin typeface="+mn-lt"/>
+                <a:ea typeface="+mn-ea"/>
+                <a:cs typeface="+mn-cs"/>
+              </a:rPr>
+              <a:t>1 Peter 3:20-21</a:t>
+            </a:r>
+          </a:p>
+          <a:p>
+            <a:r>
+              <a:rPr lang="en-US" sz="1200" b="0" i="0" kern="1200" dirty="0" smtClean="0">
+                <a:solidFill>
+                  <a:schemeClr val="tx1"/>
+                </a:solidFill>
+                <a:latin typeface="+mn-lt"/>
+                <a:ea typeface="+mn-ea"/>
+                <a:cs typeface="+mn-cs"/>
+              </a:rPr>
+              <a:t>… God patiently waited in the days of Noah during the building of the ark, in which a few persons, eight in all, were saved through water.21This prefigured baptism, which saves you now. It is not a removal of dirt from the body but an appeal to God </a:t>
+            </a:r>
+            <a:r>
+              <a:rPr lang="en-US" sz="1200" b="0" i="0" kern="1200" baseline="30000" dirty="0" smtClean="0">
+                <a:solidFill>
+                  <a:schemeClr val="tx1"/>
+                </a:solidFill>
+                <a:latin typeface="+mn-lt"/>
+                <a:ea typeface="+mn-ea"/>
+                <a:cs typeface="+mn-cs"/>
+                <a:hlinkClick r:id="rId3"/>
+              </a:rPr>
+              <a:t>7</a:t>
+            </a:r>
+            <a:r>
+              <a:rPr lang="en-US" sz="1200" b="0" i="0" kern="1200" dirty="0" smtClean="0">
+                <a:solidFill>
+                  <a:schemeClr val="tx1"/>
+                </a:solidFill>
+                <a:latin typeface="+mn-lt"/>
+                <a:ea typeface="+mn-ea"/>
+                <a:cs typeface="+mn-cs"/>
+              </a:rPr>
+              <a:t> for a clear conscience, through the resurrection of Jesus Christ,</a:t>
+            </a:r>
+          </a:p>
+          <a:p>
+            <a:endParaRPr lang="en-US" sz="1200" b="0" i="0" kern="1200" dirty="0" smtClean="0">
+              <a:solidFill>
+                <a:schemeClr val="tx1"/>
+              </a:solidFill>
+              <a:latin typeface="+mn-lt"/>
+              <a:ea typeface="+mn-ea"/>
+              <a:cs typeface="+mn-cs"/>
+            </a:endParaRPr>
+          </a:p>
+          <a:p>
+            <a:r>
+              <a:rPr lang="en-US" sz="1200" b="0" i="0" kern="1200" dirty="0" smtClean="0">
+                <a:solidFill>
+                  <a:schemeClr val="tx1"/>
+                </a:solidFill>
+                <a:latin typeface="+mn-lt"/>
+                <a:ea typeface="+mn-ea"/>
+                <a:cs typeface="+mn-cs"/>
+              </a:rPr>
+              <a:t>Mark 5:</a:t>
+            </a:r>
+            <a:r>
+              <a:rPr lang="en-US" sz="1200" b="0" i="0" kern="1200" baseline="0" dirty="0" smtClean="0">
+                <a:solidFill>
+                  <a:schemeClr val="tx1"/>
+                </a:solidFill>
+                <a:latin typeface="+mn-lt"/>
+                <a:ea typeface="+mn-ea"/>
+                <a:cs typeface="+mn-cs"/>
+              </a:rPr>
+              <a:t> 27-34</a:t>
+            </a:r>
+          </a:p>
+          <a:p>
+            <a:r>
+              <a:rPr lang="en-US" sz="1200" b="0" i="0" kern="1200" dirty="0" smtClean="0">
+                <a:solidFill>
+                  <a:schemeClr val="tx1"/>
+                </a:solidFill>
+                <a:latin typeface="+mn-lt"/>
+                <a:ea typeface="+mn-ea"/>
+                <a:cs typeface="+mn-cs"/>
+              </a:rPr>
+              <a:t>he had heard about Jesus and came up behind him in the crowd and touched his cloak.28</a:t>
+            </a:r>
+            <a:r>
+              <a:rPr lang="en-US" sz="1200" b="0" i="0" kern="1200" baseline="30000" dirty="0" smtClean="0">
+                <a:solidFill>
+                  <a:schemeClr val="tx1"/>
+                </a:solidFill>
+                <a:latin typeface="+mn-lt"/>
+                <a:ea typeface="+mn-ea"/>
+                <a:cs typeface="+mn-cs"/>
+                <a:hlinkClick r:id="rId4"/>
+              </a:rPr>
+              <a:t>9</a:t>
+            </a:r>
+            <a:r>
+              <a:rPr lang="en-US" sz="1200" b="0" i="0" kern="1200" dirty="0" smtClean="0">
+                <a:solidFill>
+                  <a:schemeClr val="tx1"/>
+                </a:solidFill>
+                <a:latin typeface="+mn-lt"/>
+                <a:ea typeface="+mn-ea"/>
+                <a:cs typeface="+mn-cs"/>
+              </a:rPr>
+              <a:t> She said, "If I but touch his clothes, I shall be cured."29Immediately her flow of blood dried up. She felt in her body that she was healed of her affliction.30Jesus, aware at once that power had gone out from him, turned around in the crowd and asked, "Who has touched my clothes?"31But his disciples said to him, "You see how the crowd is pressing upon you, and yet you ask, 'Who touched me?'"32And he looked around to see who had done it.33The woman, realizing what had happened to her, approached in fear and trembling. She fell down before Jesus and told him the whole truth.34He said to her, "Daughter, your faith has saved you. </a:t>
+            </a:r>
+            <a:r>
+              <a:rPr lang="en-US" sz="1200" b="0" i="0" kern="1200" smtClean="0">
+                <a:solidFill>
+                  <a:schemeClr val="tx1"/>
+                </a:solidFill>
+                <a:latin typeface="+mn-lt"/>
+                <a:ea typeface="+mn-ea"/>
+                <a:cs typeface="+mn-cs"/>
+              </a:rPr>
+              <a:t>Go in peace and be cured of your affliction."</a:t>
             </a:r>
             <a:endParaRPr lang="en-US" dirty="0"/>
           </a:p>
@@ -2924,6 +3065,989 @@
             </a:r>
           </a:p>
           <a:p>
+            <a:endParaRPr lang="en-US" dirty="0" smtClean="0"/>
+          </a:p>
+          <a:p>
+            <a:endParaRPr lang="en-US" dirty="0" smtClean="0"/>
+          </a:p>
+          <a:p>
+            <a:endParaRPr lang="en-US" dirty="0" smtClean="0"/>
+          </a:p>
+          <a:p>
+            <a:r>
+              <a:rPr lang="en-US" sz="1200" b="0" i="0" kern="1200" dirty="0" smtClean="0">
+                <a:solidFill>
+                  <a:schemeClr val="tx1"/>
+                </a:solidFill>
+                <a:latin typeface="+mn-lt"/>
+                <a:ea typeface="+mn-ea"/>
+                <a:cs typeface="+mn-cs"/>
+              </a:rPr>
+              <a:t>The following are some non-Catholic Churches without valid baptisms:</a:t>
+            </a:r>
+            <a:br>
+              <a:rPr lang="en-US" sz="1200" b="0" i="0" kern="1200" dirty="0" smtClean="0">
+                <a:solidFill>
+                  <a:schemeClr val="tx1"/>
+                </a:solidFill>
+                <a:latin typeface="+mn-lt"/>
+                <a:ea typeface="+mn-ea"/>
+                <a:cs typeface="+mn-cs"/>
+              </a:rPr>
+            </a:br>
+            <a:r>
+              <a:rPr lang="en-US" sz="1200" b="0" i="0" kern="1200" dirty="0" smtClean="0">
+                <a:solidFill>
+                  <a:schemeClr val="tx1"/>
+                </a:solidFill>
+                <a:latin typeface="+mn-lt"/>
+                <a:ea typeface="+mn-ea"/>
+                <a:cs typeface="+mn-cs"/>
+              </a:rPr>
+              <a:t>· Apostolic Church</a:t>
+            </a:r>
+            <a:br>
+              <a:rPr lang="en-US" sz="1200" b="0" i="0" kern="1200" dirty="0" smtClean="0">
+                <a:solidFill>
+                  <a:schemeClr val="tx1"/>
+                </a:solidFill>
+                <a:latin typeface="+mn-lt"/>
+                <a:ea typeface="+mn-ea"/>
+                <a:cs typeface="+mn-cs"/>
+              </a:rPr>
+            </a:br>
+            <a:r>
+              <a:rPr lang="en-US" sz="1200" b="0" i="0" kern="1200" dirty="0" smtClean="0">
+                <a:solidFill>
+                  <a:schemeClr val="tx1"/>
+                </a:solidFill>
+                <a:latin typeface="+mn-lt"/>
+                <a:ea typeface="+mn-ea"/>
+                <a:cs typeface="+mn-cs"/>
+              </a:rPr>
+              <a:t>· Bohemian Free Thinkers</a:t>
+            </a:r>
+            <a:br>
+              <a:rPr lang="en-US" sz="1200" b="0" i="0" kern="1200" dirty="0" smtClean="0">
+                <a:solidFill>
+                  <a:schemeClr val="tx1"/>
+                </a:solidFill>
+                <a:latin typeface="+mn-lt"/>
+                <a:ea typeface="+mn-ea"/>
+                <a:cs typeface="+mn-cs"/>
+              </a:rPr>
+            </a:br>
+            <a:r>
+              <a:rPr lang="en-US" sz="1200" b="0" i="0" kern="1200" dirty="0" smtClean="0">
+                <a:solidFill>
+                  <a:schemeClr val="tx1"/>
+                </a:solidFill>
+                <a:latin typeface="+mn-lt"/>
+                <a:ea typeface="+mn-ea"/>
+                <a:cs typeface="+mn-cs"/>
+              </a:rPr>
+              <a:t>· </a:t>
+            </a:r>
+            <a:r>
+              <a:rPr lang="en-US" sz="1200" b="0" i="0" kern="1200" dirty="0" err="1" smtClean="0">
+                <a:solidFill>
+                  <a:schemeClr val="tx1"/>
+                </a:solidFill>
+                <a:latin typeface="+mn-lt"/>
+                <a:ea typeface="+mn-ea"/>
+                <a:cs typeface="+mn-cs"/>
+              </a:rPr>
+              <a:t>Christadelphians</a:t>
+            </a:r>
+            <a:r>
+              <a:rPr lang="en-US" sz="1200" b="0" i="0" kern="1200" dirty="0" smtClean="0">
+                <a:solidFill>
+                  <a:schemeClr val="tx1"/>
+                </a:solidFill>
+                <a:latin typeface="+mn-lt"/>
+                <a:ea typeface="+mn-ea"/>
+                <a:cs typeface="+mn-cs"/>
+              </a:rPr>
+              <a:t/>
+            </a:r>
+            <a:br>
+              <a:rPr lang="en-US" sz="1200" b="0" i="0" kern="1200" dirty="0" smtClean="0">
+                <a:solidFill>
+                  <a:schemeClr val="tx1"/>
+                </a:solidFill>
+                <a:latin typeface="+mn-lt"/>
+                <a:ea typeface="+mn-ea"/>
+                <a:cs typeface="+mn-cs"/>
+              </a:rPr>
+            </a:br>
+            <a:r>
+              <a:rPr lang="en-US" sz="1200" b="0" i="0" kern="1200" dirty="0" smtClean="0">
+                <a:solidFill>
+                  <a:schemeClr val="tx1"/>
+                </a:solidFill>
+                <a:latin typeface="+mn-lt"/>
+                <a:ea typeface="+mn-ea"/>
+                <a:cs typeface="+mn-cs"/>
+              </a:rPr>
+              <a:t>· Christian Community</a:t>
+            </a:r>
+            <a:r>
+              <a:rPr lang="en-US" sz="1200" b="0" i="0" kern="1200" baseline="0" dirty="0" smtClean="0">
+                <a:solidFill>
+                  <a:schemeClr val="tx1"/>
+                </a:solidFill>
+                <a:latin typeface="+mn-lt"/>
+                <a:ea typeface="+mn-ea"/>
+                <a:cs typeface="+mn-cs"/>
+              </a:rPr>
+              <a:t> </a:t>
+            </a:r>
+            <a:r>
+              <a:rPr lang="en-US" sz="1200" b="0" i="0" kern="1200" dirty="0" smtClean="0">
+                <a:solidFill>
+                  <a:schemeClr val="tx1"/>
+                </a:solidFill>
+                <a:latin typeface="+mn-lt"/>
+                <a:ea typeface="+mn-ea"/>
+                <a:cs typeface="+mn-cs"/>
+              </a:rPr>
+              <a:t>(Rudolf Steiner)</a:t>
+            </a:r>
+            <a:br>
+              <a:rPr lang="en-US" sz="1200" b="0" i="0" kern="1200" dirty="0" smtClean="0">
+                <a:solidFill>
+                  <a:schemeClr val="tx1"/>
+                </a:solidFill>
+                <a:latin typeface="+mn-lt"/>
+                <a:ea typeface="+mn-ea"/>
+                <a:cs typeface="+mn-cs"/>
+              </a:rPr>
+            </a:br>
+            <a:r>
+              <a:rPr lang="en-US" sz="1200" b="0" i="0" kern="1200" dirty="0" smtClean="0">
+                <a:solidFill>
+                  <a:schemeClr val="tx1"/>
+                </a:solidFill>
+                <a:latin typeface="+mn-lt"/>
+                <a:ea typeface="+mn-ea"/>
+                <a:cs typeface="+mn-cs"/>
+              </a:rPr>
+              <a:t>· Christian Scientists</a:t>
+            </a:r>
+            <a:br>
+              <a:rPr lang="en-US" sz="1200" b="0" i="0" kern="1200" dirty="0" smtClean="0">
+                <a:solidFill>
+                  <a:schemeClr val="tx1"/>
+                </a:solidFill>
+                <a:latin typeface="+mn-lt"/>
+                <a:ea typeface="+mn-ea"/>
+                <a:cs typeface="+mn-cs"/>
+              </a:rPr>
+            </a:br>
+            <a:r>
+              <a:rPr lang="en-US" sz="1200" b="0" i="0" kern="1200" dirty="0" smtClean="0">
+                <a:solidFill>
+                  <a:schemeClr val="tx1"/>
+                </a:solidFill>
+                <a:latin typeface="+mn-lt"/>
+                <a:ea typeface="+mn-ea"/>
+                <a:cs typeface="+mn-cs"/>
+              </a:rPr>
+              <a:t>· Church of Divine Science</a:t>
+            </a:r>
+          </a:p>
+          <a:p>
+            <a:r>
+              <a:rPr lang="en-US" sz="1200" b="0" i="0" kern="1200" dirty="0" smtClean="0">
+                <a:solidFill>
+                  <a:schemeClr val="tx1"/>
+                </a:solidFill>
+                <a:latin typeface="+mn-lt"/>
+                <a:ea typeface="+mn-ea"/>
+                <a:cs typeface="+mn-cs"/>
+              </a:rPr>
+              <a:t>· Church of God</a:t>
+            </a:r>
+            <a:br>
+              <a:rPr lang="en-US" sz="1200" b="0" i="0" kern="1200" dirty="0" smtClean="0">
+                <a:solidFill>
+                  <a:schemeClr val="tx1"/>
+                </a:solidFill>
+                <a:latin typeface="+mn-lt"/>
+                <a:ea typeface="+mn-ea"/>
+                <a:cs typeface="+mn-cs"/>
+              </a:rPr>
+            </a:br>
+            <a:r>
+              <a:rPr lang="en-US" sz="1200" b="0" i="0" kern="1200" dirty="0" smtClean="0">
+                <a:solidFill>
+                  <a:schemeClr val="tx1"/>
+                </a:solidFill>
+                <a:latin typeface="+mn-lt"/>
+                <a:ea typeface="+mn-ea"/>
+                <a:cs typeface="+mn-cs"/>
+              </a:rPr>
+              <a:t>· Jehovah’s Witnesses</a:t>
+            </a:r>
+            <a:br>
+              <a:rPr lang="en-US" sz="1200" b="0" i="0" kern="1200" dirty="0" smtClean="0">
+                <a:solidFill>
+                  <a:schemeClr val="tx1"/>
+                </a:solidFill>
+                <a:latin typeface="+mn-lt"/>
+                <a:ea typeface="+mn-ea"/>
+                <a:cs typeface="+mn-cs"/>
+              </a:rPr>
+            </a:br>
+            <a:r>
+              <a:rPr lang="en-US" sz="1200" b="0" i="0" kern="1200" dirty="0" smtClean="0">
+                <a:solidFill>
+                  <a:schemeClr val="tx1"/>
+                </a:solidFill>
+                <a:latin typeface="+mn-lt"/>
+                <a:ea typeface="+mn-ea"/>
+                <a:cs typeface="+mn-cs"/>
+              </a:rPr>
+              <a:t>· Masons (no baptism at all)</a:t>
+            </a:r>
+            <a:br>
+              <a:rPr lang="en-US" sz="1200" b="0" i="0" kern="1200" dirty="0" smtClean="0">
+                <a:solidFill>
+                  <a:schemeClr val="tx1"/>
+                </a:solidFill>
+                <a:latin typeface="+mn-lt"/>
+                <a:ea typeface="+mn-ea"/>
+                <a:cs typeface="+mn-cs"/>
+              </a:rPr>
+            </a:br>
+            <a:r>
+              <a:rPr lang="en-US" sz="1200" b="0" i="0" kern="1200" dirty="0" smtClean="0">
+                <a:solidFill>
+                  <a:schemeClr val="tx1"/>
+                </a:solidFill>
+                <a:latin typeface="+mn-lt"/>
+                <a:ea typeface="+mn-ea"/>
+                <a:cs typeface="+mn-cs"/>
+              </a:rPr>
+              <a:t>· Mormons </a:t>
+            </a:r>
+            <a:br>
+              <a:rPr lang="en-US" sz="1200" b="0" i="0" kern="1200" dirty="0" smtClean="0">
+                <a:solidFill>
+                  <a:schemeClr val="tx1"/>
+                </a:solidFill>
+                <a:latin typeface="+mn-lt"/>
+                <a:ea typeface="+mn-ea"/>
+                <a:cs typeface="+mn-cs"/>
+              </a:rPr>
+            </a:br>
+            <a:r>
+              <a:rPr lang="en-US" sz="1200" b="0" i="0" kern="1200" dirty="0" smtClean="0">
+                <a:solidFill>
+                  <a:schemeClr val="tx1"/>
+                </a:solidFill>
+                <a:latin typeface="+mn-lt"/>
+                <a:ea typeface="+mn-ea"/>
+                <a:cs typeface="+mn-cs"/>
+              </a:rPr>
+              <a:t>· Church of the New Jerusalem</a:t>
+            </a:r>
+            <a:br>
+              <a:rPr lang="en-US" sz="1200" b="0" i="0" kern="1200" dirty="0" smtClean="0">
+                <a:solidFill>
+                  <a:schemeClr val="tx1"/>
+                </a:solidFill>
+                <a:latin typeface="+mn-lt"/>
+                <a:ea typeface="+mn-ea"/>
+                <a:cs typeface="+mn-cs"/>
+              </a:rPr>
+            </a:br>
+            <a:r>
+              <a:rPr lang="en-US" sz="1200" b="0" i="0" kern="1200" dirty="0" smtClean="0">
+                <a:solidFill>
+                  <a:schemeClr val="tx1"/>
+                </a:solidFill>
+                <a:latin typeface="+mn-lt"/>
+                <a:ea typeface="+mn-ea"/>
+                <a:cs typeface="+mn-cs"/>
+              </a:rPr>
+              <a:t>· Pentecostal churches</a:t>
+            </a:r>
+            <a:br>
+              <a:rPr lang="en-US" sz="1200" b="0" i="0" kern="1200" dirty="0" smtClean="0">
+                <a:solidFill>
+                  <a:schemeClr val="tx1"/>
+                </a:solidFill>
+                <a:latin typeface="+mn-lt"/>
+                <a:ea typeface="+mn-ea"/>
+                <a:cs typeface="+mn-cs"/>
+              </a:rPr>
+            </a:br>
+            <a:r>
+              <a:rPr lang="en-US" sz="1200" b="0" i="0" kern="1200" dirty="0" smtClean="0">
+                <a:solidFill>
+                  <a:schemeClr val="tx1"/>
+                </a:solidFill>
+                <a:latin typeface="+mn-lt"/>
+                <a:ea typeface="+mn-ea"/>
+                <a:cs typeface="+mn-cs"/>
+              </a:rPr>
+              <a:t>· Peoples Church of Chicago</a:t>
+            </a:r>
+            <a:br>
+              <a:rPr lang="en-US" sz="1200" b="0" i="0" kern="1200" dirty="0" smtClean="0">
+                <a:solidFill>
+                  <a:schemeClr val="tx1"/>
+                </a:solidFill>
+                <a:latin typeface="+mn-lt"/>
+                <a:ea typeface="+mn-ea"/>
+                <a:cs typeface="+mn-cs"/>
+              </a:rPr>
+            </a:br>
+            <a:r>
+              <a:rPr lang="en-US" sz="1200" b="0" i="0" kern="1200" dirty="0" smtClean="0">
+                <a:solidFill>
+                  <a:schemeClr val="tx1"/>
+                </a:solidFill>
+                <a:latin typeface="+mn-lt"/>
+                <a:ea typeface="+mn-ea"/>
+                <a:cs typeface="+mn-cs"/>
+              </a:rPr>
+              <a:t>· Quakers</a:t>
+            </a:r>
+            <a:br>
+              <a:rPr lang="en-US" sz="1200" b="0" i="0" kern="1200" dirty="0" smtClean="0">
+                <a:solidFill>
+                  <a:schemeClr val="tx1"/>
+                </a:solidFill>
+                <a:latin typeface="+mn-lt"/>
+                <a:ea typeface="+mn-ea"/>
+                <a:cs typeface="+mn-cs"/>
+              </a:rPr>
+            </a:br>
+            <a:r>
+              <a:rPr lang="en-US" sz="1200" b="0" i="0" kern="1200" dirty="0" smtClean="0">
+                <a:solidFill>
+                  <a:schemeClr val="tx1"/>
+                </a:solidFill>
+                <a:latin typeface="+mn-lt"/>
+                <a:ea typeface="+mn-ea"/>
+                <a:cs typeface="+mn-cs"/>
+              </a:rPr>
+              <a:t>· Salvation Army</a:t>
+            </a:r>
+            <a:br>
+              <a:rPr lang="en-US" sz="1200" b="0" i="0" kern="1200" dirty="0" smtClean="0">
+                <a:solidFill>
+                  <a:schemeClr val="tx1"/>
+                </a:solidFill>
+                <a:latin typeface="+mn-lt"/>
+                <a:ea typeface="+mn-ea"/>
+                <a:cs typeface="+mn-cs"/>
+              </a:rPr>
+            </a:br>
+            <a:r>
+              <a:rPr lang="en-US" sz="1200" b="0" i="0" kern="1200" dirty="0" smtClean="0">
+                <a:solidFill>
+                  <a:schemeClr val="tx1"/>
+                </a:solidFill>
+                <a:latin typeface="+mn-lt"/>
+                <a:ea typeface="+mn-ea"/>
+                <a:cs typeface="+mn-cs"/>
+              </a:rPr>
+              <a:t>· Unitarians</a:t>
+            </a:r>
+            <a:br>
+              <a:rPr lang="en-US" sz="1200" b="0" i="0" kern="1200" dirty="0" smtClean="0">
+                <a:solidFill>
+                  <a:schemeClr val="tx1"/>
+                </a:solidFill>
+                <a:latin typeface="+mn-lt"/>
+                <a:ea typeface="+mn-ea"/>
+                <a:cs typeface="+mn-cs"/>
+              </a:rPr>
+            </a:br>
+            <a:r>
+              <a:rPr lang="en-US" sz="1200" b="0" i="0" kern="1200" dirty="0" smtClean="0">
+                <a:solidFill>
+                  <a:schemeClr val="tx1"/>
+                </a:solidFill>
+                <a:latin typeface="+mn-lt"/>
+                <a:ea typeface="+mn-ea"/>
+                <a:cs typeface="+mn-cs"/>
+              </a:rPr>
+              <a:t/>
+            </a:r>
+            <a:br>
+              <a:rPr lang="en-US" sz="1200" b="0" i="0" kern="1200" dirty="0" smtClean="0">
+                <a:solidFill>
+                  <a:schemeClr val="tx1"/>
+                </a:solidFill>
+                <a:latin typeface="+mn-lt"/>
+                <a:ea typeface="+mn-ea"/>
+                <a:cs typeface="+mn-cs"/>
+              </a:rPr>
+            </a:br>
+            <a:r>
+              <a:rPr lang="en-US" sz="1200" b="0" i="0" kern="1200" dirty="0" smtClean="0">
+                <a:solidFill>
+                  <a:schemeClr val="tx1"/>
+                </a:solidFill>
+                <a:latin typeface="+mn-lt"/>
+                <a:ea typeface="+mn-ea"/>
+                <a:cs typeface="+mn-cs"/>
+              </a:rPr>
+              <a:t>The following are some non-Catholic Churches that have valid baptisms:</a:t>
+            </a:r>
+            <a:br>
+              <a:rPr lang="en-US" sz="1200" b="0" i="0" kern="1200" dirty="0" smtClean="0">
+                <a:solidFill>
+                  <a:schemeClr val="tx1"/>
+                </a:solidFill>
+                <a:latin typeface="+mn-lt"/>
+                <a:ea typeface="+mn-ea"/>
+                <a:cs typeface="+mn-cs"/>
+              </a:rPr>
+            </a:br>
+            <a:r>
+              <a:rPr lang="en-US" sz="1200" b="0" i="0" kern="1200" dirty="0" smtClean="0">
+                <a:solidFill>
+                  <a:schemeClr val="tx1"/>
+                </a:solidFill>
+                <a:latin typeface="+mn-lt"/>
+                <a:ea typeface="+mn-ea"/>
+                <a:cs typeface="+mn-cs"/>
+              </a:rPr>
+              <a:t/>
+            </a:r>
+            <a:br>
+              <a:rPr lang="en-US" sz="1200" b="0" i="0" kern="1200" dirty="0" smtClean="0">
+                <a:solidFill>
+                  <a:schemeClr val="tx1"/>
+                </a:solidFill>
+                <a:latin typeface="+mn-lt"/>
+                <a:ea typeface="+mn-ea"/>
+                <a:cs typeface="+mn-cs"/>
+              </a:rPr>
+            </a:br>
+            <a:r>
+              <a:rPr lang="en-US" sz="1200" b="0" i="0" kern="1200" dirty="0" smtClean="0">
+                <a:solidFill>
+                  <a:schemeClr val="tx1"/>
+                </a:solidFill>
+                <a:latin typeface="+mn-lt"/>
+                <a:ea typeface="+mn-ea"/>
+                <a:cs typeface="+mn-cs"/>
+              </a:rPr>
+              <a:t>· All Eastern non-Catholics (Orthodox) *</a:t>
+            </a:r>
+            <a:br>
+              <a:rPr lang="en-US" sz="1200" b="0" i="0" kern="1200" dirty="0" smtClean="0">
+                <a:solidFill>
+                  <a:schemeClr val="tx1"/>
+                </a:solidFill>
+                <a:latin typeface="+mn-lt"/>
+                <a:ea typeface="+mn-ea"/>
+                <a:cs typeface="+mn-cs"/>
+              </a:rPr>
+            </a:br>
+            <a:r>
+              <a:rPr lang="en-US" sz="1200" b="0" i="0" kern="1200" dirty="0" smtClean="0">
+                <a:solidFill>
+                  <a:schemeClr val="tx1"/>
+                </a:solidFill>
+                <a:latin typeface="+mn-lt"/>
+                <a:ea typeface="+mn-ea"/>
+                <a:cs typeface="+mn-cs"/>
+              </a:rPr>
+              <a:t>· Adventists </a:t>
+            </a:r>
+            <a:br>
+              <a:rPr lang="en-US" sz="1200" b="0" i="0" kern="1200" dirty="0" smtClean="0">
+                <a:solidFill>
+                  <a:schemeClr val="tx1"/>
+                </a:solidFill>
+                <a:latin typeface="+mn-lt"/>
+                <a:ea typeface="+mn-ea"/>
+                <a:cs typeface="+mn-cs"/>
+              </a:rPr>
+            </a:br>
+            <a:r>
+              <a:rPr lang="en-US" sz="1200" b="0" i="0" kern="1200" dirty="0" smtClean="0">
+                <a:solidFill>
+                  <a:schemeClr val="tx1"/>
+                </a:solidFill>
+                <a:latin typeface="+mn-lt"/>
+                <a:ea typeface="+mn-ea"/>
+                <a:cs typeface="+mn-cs"/>
+              </a:rPr>
+              <a:t>· African Methodist Episcopal</a:t>
+            </a:r>
+            <a:br>
+              <a:rPr lang="en-US" sz="1200" b="0" i="0" kern="1200" dirty="0" smtClean="0">
+                <a:solidFill>
+                  <a:schemeClr val="tx1"/>
+                </a:solidFill>
+                <a:latin typeface="+mn-lt"/>
+                <a:ea typeface="+mn-ea"/>
+                <a:cs typeface="+mn-cs"/>
+              </a:rPr>
+            </a:br>
+            <a:r>
+              <a:rPr lang="en-US" sz="1200" b="0" i="0" kern="1200" dirty="0" smtClean="0">
+                <a:solidFill>
+                  <a:schemeClr val="tx1"/>
+                </a:solidFill>
+                <a:latin typeface="+mn-lt"/>
+                <a:ea typeface="+mn-ea"/>
+                <a:cs typeface="+mn-cs"/>
+              </a:rPr>
+              <a:t>· Amish</a:t>
+            </a:r>
+            <a:br>
+              <a:rPr lang="en-US" sz="1200" b="0" i="0" kern="1200" dirty="0" smtClean="0">
+                <a:solidFill>
+                  <a:schemeClr val="tx1"/>
+                </a:solidFill>
+                <a:latin typeface="+mn-lt"/>
+                <a:ea typeface="+mn-ea"/>
+                <a:cs typeface="+mn-cs"/>
+              </a:rPr>
+            </a:br>
+            <a:r>
+              <a:rPr lang="en-US" sz="1200" b="0" i="0" kern="1200" dirty="0" smtClean="0">
+                <a:solidFill>
+                  <a:schemeClr val="tx1"/>
+                </a:solidFill>
+                <a:latin typeface="+mn-lt"/>
+                <a:ea typeface="+mn-ea"/>
+                <a:cs typeface="+mn-cs"/>
+              </a:rPr>
+              <a:t>· Anglican</a:t>
+            </a:r>
+            <a:br>
+              <a:rPr lang="en-US" sz="1200" b="0" i="0" kern="1200" dirty="0" smtClean="0">
+                <a:solidFill>
+                  <a:schemeClr val="tx1"/>
+                </a:solidFill>
+                <a:latin typeface="+mn-lt"/>
+                <a:ea typeface="+mn-ea"/>
+                <a:cs typeface="+mn-cs"/>
+              </a:rPr>
+            </a:br>
+            <a:r>
+              <a:rPr lang="en-US" sz="1200" b="0" i="0" kern="1200" dirty="0" smtClean="0">
+                <a:solidFill>
+                  <a:schemeClr val="tx1"/>
+                </a:solidFill>
+                <a:latin typeface="+mn-lt"/>
+                <a:ea typeface="+mn-ea"/>
+                <a:cs typeface="+mn-cs"/>
+              </a:rPr>
+              <a:t>· Assembly of God</a:t>
+            </a:r>
+            <a:br>
+              <a:rPr lang="en-US" sz="1200" b="0" i="0" kern="1200" dirty="0" smtClean="0">
+                <a:solidFill>
+                  <a:schemeClr val="tx1"/>
+                </a:solidFill>
+                <a:latin typeface="+mn-lt"/>
+                <a:ea typeface="+mn-ea"/>
+                <a:cs typeface="+mn-cs"/>
+              </a:rPr>
+            </a:br>
+            <a:r>
+              <a:rPr lang="en-US" sz="1200" b="0" i="0" kern="1200" dirty="0" smtClean="0">
+                <a:solidFill>
+                  <a:schemeClr val="tx1"/>
+                </a:solidFill>
+                <a:latin typeface="+mn-lt"/>
+                <a:ea typeface="+mn-ea"/>
+                <a:cs typeface="+mn-cs"/>
+              </a:rPr>
+              <a:t>· Baptists</a:t>
+            </a:r>
+            <a:br>
+              <a:rPr lang="en-US" sz="1200" b="0" i="0" kern="1200" dirty="0" smtClean="0">
+                <a:solidFill>
+                  <a:schemeClr val="tx1"/>
+                </a:solidFill>
+                <a:latin typeface="+mn-lt"/>
+                <a:ea typeface="+mn-ea"/>
+                <a:cs typeface="+mn-cs"/>
+              </a:rPr>
+            </a:br>
+            <a:r>
+              <a:rPr lang="en-US" sz="1200" b="0" i="0" kern="1200" dirty="0" smtClean="0">
+                <a:solidFill>
+                  <a:schemeClr val="tx1"/>
+                </a:solidFill>
+                <a:latin typeface="+mn-lt"/>
+                <a:ea typeface="+mn-ea"/>
+                <a:cs typeface="+mn-cs"/>
+              </a:rPr>
+              <a:t>· Christian and Missionary Alliance</a:t>
+            </a:r>
+            <a:br>
+              <a:rPr lang="en-US" sz="1200" b="0" i="0" kern="1200" dirty="0" smtClean="0">
+                <a:solidFill>
+                  <a:schemeClr val="tx1"/>
+                </a:solidFill>
+                <a:latin typeface="+mn-lt"/>
+                <a:ea typeface="+mn-ea"/>
+                <a:cs typeface="+mn-cs"/>
+              </a:rPr>
+            </a:br>
+            <a:r>
+              <a:rPr lang="en-US" sz="1200" b="0" i="0" kern="1200" dirty="0" smtClean="0">
+                <a:solidFill>
+                  <a:schemeClr val="tx1"/>
+                </a:solidFill>
+                <a:latin typeface="+mn-lt"/>
+                <a:ea typeface="+mn-ea"/>
+                <a:cs typeface="+mn-cs"/>
+              </a:rPr>
+              <a:t>· Church of the Brethren</a:t>
+            </a:r>
+            <a:br>
+              <a:rPr lang="en-US" sz="1200" b="0" i="0" kern="1200" dirty="0" smtClean="0">
+                <a:solidFill>
+                  <a:schemeClr val="tx1"/>
+                </a:solidFill>
+                <a:latin typeface="+mn-lt"/>
+                <a:ea typeface="+mn-ea"/>
+                <a:cs typeface="+mn-cs"/>
+              </a:rPr>
+            </a:br>
+            <a:r>
+              <a:rPr lang="en-US" sz="1200" b="0" i="0" kern="1200" dirty="0" smtClean="0">
+                <a:solidFill>
+                  <a:schemeClr val="tx1"/>
+                </a:solidFill>
+                <a:latin typeface="+mn-lt"/>
+                <a:ea typeface="+mn-ea"/>
+                <a:cs typeface="+mn-cs"/>
+              </a:rPr>
+              <a:t>· Congregational Church</a:t>
+            </a:r>
+            <a:br>
+              <a:rPr lang="en-US" sz="1200" b="0" i="0" kern="1200" dirty="0" smtClean="0">
+                <a:solidFill>
+                  <a:schemeClr val="tx1"/>
+                </a:solidFill>
+                <a:latin typeface="+mn-lt"/>
+                <a:ea typeface="+mn-ea"/>
+                <a:cs typeface="+mn-cs"/>
+              </a:rPr>
+            </a:br>
+            <a:r>
+              <a:rPr lang="en-US" sz="1200" b="0" i="0" kern="1200" dirty="0" smtClean="0">
+                <a:solidFill>
+                  <a:schemeClr val="tx1"/>
+                </a:solidFill>
+                <a:latin typeface="+mn-lt"/>
+                <a:ea typeface="+mn-ea"/>
+                <a:cs typeface="+mn-cs"/>
+              </a:rPr>
+              <a:t>· Disciples of Christ</a:t>
+            </a:r>
+            <a:br>
+              <a:rPr lang="en-US" sz="1200" b="0" i="0" kern="1200" dirty="0" smtClean="0">
+                <a:solidFill>
+                  <a:schemeClr val="tx1"/>
+                </a:solidFill>
+                <a:latin typeface="+mn-lt"/>
+                <a:ea typeface="+mn-ea"/>
+                <a:cs typeface="+mn-cs"/>
+              </a:rPr>
+            </a:br>
+            <a:r>
+              <a:rPr lang="en-US" sz="1200" b="0" i="0" kern="1200" dirty="0" smtClean="0">
+                <a:solidFill>
+                  <a:schemeClr val="tx1"/>
+                </a:solidFill>
+                <a:latin typeface="+mn-lt"/>
+                <a:ea typeface="+mn-ea"/>
+                <a:cs typeface="+mn-cs"/>
+              </a:rPr>
+              <a:t>· Episcopalians</a:t>
+            </a:r>
+            <a:br>
+              <a:rPr lang="en-US" sz="1200" b="0" i="0" kern="1200" dirty="0" smtClean="0">
+                <a:solidFill>
+                  <a:schemeClr val="tx1"/>
+                </a:solidFill>
+                <a:latin typeface="+mn-lt"/>
+                <a:ea typeface="+mn-ea"/>
+                <a:cs typeface="+mn-cs"/>
+              </a:rPr>
+            </a:br>
+            <a:r>
+              <a:rPr lang="en-US" sz="1200" b="0" i="0" kern="1200" dirty="0" smtClean="0">
+                <a:solidFill>
+                  <a:schemeClr val="tx1"/>
+                </a:solidFill>
+                <a:latin typeface="+mn-lt"/>
+                <a:ea typeface="+mn-ea"/>
+                <a:cs typeface="+mn-cs"/>
+              </a:rPr>
+              <a:t>· Evangelical United Brethren</a:t>
+            </a:r>
+            <a:br>
+              <a:rPr lang="en-US" sz="1200" b="0" i="0" kern="1200" dirty="0" smtClean="0">
+                <a:solidFill>
+                  <a:schemeClr val="tx1"/>
+                </a:solidFill>
+                <a:latin typeface="+mn-lt"/>
+                <a:ea typeface="+mn-ea"/>
+                <a:cs typeface="+mn-cs"/>
+              </a:rPr>
+            </a:br>
+            <a:r>
+              <a:rPr lang="en-US" sz="1200" b="0" i="0" kern="1200" dirty="0" smtClean="0">
+                <a:solidFill>
+                  <a:schemeClr val="tx1"/>
+                </a:solidFill>
+                <a:latin typeface="+mn-lt"/>
+                <a:ea typeface="+mn-ea"/>
+                <a:cs typeface="+mn-cs"/>
+              </a:rPr>
+              <a:t>· Evangelical Churches</a:t>
+            </a:r>
+            <a:br>
+              <a:rPr lang="en-US" sz="1200" b="0" i="0" kern="1200" dirty="0" smtClean="0">
+                <a:solidFill>
+                  <a:schemeClr val="tx1"/>
+                </a:solidFill>
+                <a:latin typeface="+mn-lt"/>
+                <a:ea typeface="+mn-ea"/>
+                <a:cs typeface="+mn-cs"/>
+              </a:rPr>
+            </a:br>
+            <a:r>
+              <a:rPr lang="en-US" sz="1200" b="0" i="0" kern="1200" dirty="0" smtClean="0">
+                <a:solidFill>
+                  <a:schemeClr val="tx1"/>
+                </a:solidFill>
+                <a:latin typeface="+mn-lt"/>
+                <a:ea typeface="+mn-ea"/>
+                <a:cs typeface="+mn-cs"/>
+              </a:rPr>
+              <a:t>· Liberal Catholic Church </a:t>
+            </a:r>
+            <a:br>
+              <a:rPr lang="en-US" sz="1200" b="0" i="0" kern="1200" dirty="0" smtClean="0">
+                <a:solidFill>
+                  <a:schemeClr val="tx1"/>
+                </a:solidFill>
+                <a:latin typeface="+mn-lt"/>
+                <a:ea typeface="+mn-ea"/>
+                <a:cs typeface="+mn-cs"/>
+              </a:rPr>
+            </a:br>
+            <a:r>
+              <a:rPr lang="en-US" sz="1200" b="0" i="0" kern="1200" dirty="0" smtClean="0">
+                <a:solidFill>
+                  <a:schemeClr val="tx1"/>
+                </a:solidFill>
+                <a:latin typeface="+mn-lt"/>
+                <a:ea typeface="+mn-ea"/>
+                <a:cs typeface="+mn-cs"/>
+              </a:rPr>
+              <a:t>· Lutherans</a:t>
+            </a:r>
+            <a:br>
+              <a:rPr lang="en-US" sz="1200" b="0" i="0" kern="1200" dirty="0" smtClean="0">
+                <a:solidFill>
+                  <a:schemeClr val="tx1"/>
+                </a:solidFill>
+                <a:latin typeface="+mn-lt"/>
+                <a:ea typeface="+mn-ea"/>
+                <a:cs typeface="+mn-cs"/>
+              </a:rPr>
+            </a:br>
+            <a:r>
+              <a:rPr lang="en-US" sz="1200" b="0" i="0" kern="1200" dirty="0" smtClean="0">
+                <a:solidFill>
+                  <a:schemeClr val="tx1"/>
+                </a:solidFill>
+                <a:latin typeface="+mn-lt"/>
+                <a:ea typeface="+mn-ea"/>
+                <a:cs typeface="+mn-cs"/>
+              </a:rPr>
+              <a:t>· Methodists</a:t>
+            </a:r>
+            <a:br>
+              <a:rPr lang="en-US" sz="1200" b="0" i="0" kern="1200" dirty="0" smtClean="0">
+                <a:solidFill>
+                  <a:schemeClr val="tx1"/>
+                </a:solidFill>
+                <a:latin typeface="+mn-lt"/>
+                <a:ea typeface="+mn-ea"/>
+                <a:cs typeface="+mn-cs"/>
+              </a:rPr>
+            </a:br>
+            <a:r>
+              <a:rPr lang="en-US" sz="1200" b="0" i="0" kern="1200" dirty="0" smtClean="0">
+                <a:solidFill>
+                  <a:schemeClr val="tx1"/>
+                </a:solidFill>
+                <a:latin typeface="+mn-lt"/>
+                <a:ea typeface="+mn-ea"/>
+                <a:cs typeface="+mn-cs"/>
+              </a:rPr>
+              <a:t>· Church of the </a:t>
+            </a:r>
+            <a:r>
+              <a:rPr lang="en-US" sz="1200" b="0" i="0" kern="1200" dirty="0" err="1" smtClean="0">
+                <a:solidFill>
+                  <a:schemeClr val="tx1"/>
+                </a:solidFill>
+                <a:latin typeface="+mn-lt"/>
+                <a:ea typeface="+mn-ea"/>
+                <a:cs typeface="+mn-cs"/>
+              </a:rPr>
+              <a:t>Nazzerine</a:t>
+            </a:r>
+            <a:r>
+              <a:rPr lang="en-US" sz="1200" b="0" i="0" kern="1200" dirty="0" smtClean="0">
+                <a:solidFill>
+                  <a:schemeClr val="tx1"/>
+                </a:solidFill>
+                <a:latin typeface="+mn-lt"/>
+                <a:ea typeface="+mn-ea"/>
+                <a:cs typeface="+mn-cs"/>
+              </a:rPr>
+              <a:t> </a:t>
+            </a:r>
+            <a:br>
+              <a:rPr lang="en-US" sz="1200" b="0" i="0" kern="1200" dirty="0" smtClean="0">
+                <a:solidFill>
+                  <a:schemeClr val="tx1"/>
+                </a:solidFill>
+                <a:latin typeface="+mn-lt"/>
+                <a:ea typeface="+mn-ea"/>
+                <a:cs typeface="+mn-cs"/>
+              </a:rPr>
+            </a:br>
+            <a:r>
+              <a:rPr lang="en-US" sz="1200" b="0" i="0" kern="1200" dirty="0" smtClean="0">
+                <a:solidFill>
+                  <a:schemeClr val="tx1"/>
+                </a:solidFill>
+                <a:latin typeface="+mn-lt"/>
+                <a:ea typeface="+mn-ea"/>
+                <a:cs typeface="+mn-cs"/>
+              </a:rPr>
+              <a:t>· Old Catholics</a:t>
+            </a:r>
+            <a:br>
+              <a:rPr lang="en-US" sz="1200" b="0" i="0" kern="1200" dirty="0" smtClean="0">
+                <a:solidFill>
+                  <a:schemeClr val="tx1"/>
+                </a:solidFill>
+                <a:latin typeface="+mn-lt"/>
+                <a:ea typeface="+mn-ea"/>
+                <a:cs typeface="+mn-cs"/>
+              </a:rPr>
+            </a:br>
+            <a:r>
+              <a:rPr lang="en-US" sz="1200" b="0" i="0" kern="1200" dirty="0" smtClean="0">
+                <a:solidFill>
+                  <a:schemeClr val="tx1"/>
+                </a:solidFill>
+                <a:latin typeface="+mn-lt"/>
+                <a:ea typeface="+mn-ea"/>
+                <a:cs typeface="+mn-cs"/>
+              </a:rPr>
+              <a:t>· Old Roman Catholics</a:t>
+            </a:r>
+            <a:br>
+              <a:rPr lang="en-US" sz="1200" b="0" i="0" kern="1200" dirty="0" smtClean="0">
+                <a:solidFill>
+                  <a:schemeClr val="tx1"/>
+                </a:solidFill>
+                <a:latin typeface="+mn-lt"/>
+                <a:ea typeface="+mn-ea"/>
+                <a:cs typeface="+mn-cs"/>
+              </a:rPr>
+            </a:br>
+            <a:r>
+              <a:rPr lang="en-US" sz="1200" b="0" i="0" kern="1200" dirty="0" smtClean="0">
+                <a:solidFill>
+                  <a:schemeClr val="tx1"/>
+                </a:solidFill>
+                <a:latin typeface="+mn-lt"/>
+                <a:ea typeface="+mn-ea"/>
+                <a:cs typeface="+mn-cs"/>
+              </a:rPr>
+              <a:t>· Polish National Church</a:t>
+            </a:r>
+            <a:br>
+              <a:rPr lang="en-US" sz="1200" b="0" i="0" kern="1200" dirty="0" smtClean="0">
+                <a:solidFill>
+                  <a:schemeClr val="tx1"/>
+                </a:solidFill>
+                <a:latin typeface="+mn-lt"/>
+                <a:ea typeface="+mn-ea"/>
+                <a:cs typeface="+mn-cs"/>
+              </a:rPr>
+            </a:br>
+            <a:r>
+              <a:rPr lang="en-US" sz="1200" b="0" i="0" kern="1200" dirty="0" smtClean="0">
+                <a:solidFill>
+                  <a:schemeClr val="tx1"/>
+                </a:solidFill>
+                <a:latin typeface="+mn-lt"/>
+                <a:ea typeface="+mn-ea"/>
+                <a:cs typeface="+mn-cs"/>
+              </a:rPr>
+              <a:t>· Presbyterian Church</a:t>
+            </a:r>
+            <a:br>
+              <a:rPr lang="en-US" sz="1200" b="0" i="0" kern="1200" dirty="0" smtClean="0">
+                <a:solidFill>
+                  <a:schemeClr val="tx1"/>
+                </a:solidFill>
+                <a:latin typeface="+mn-lt"/>
+                <a:ea typeface="+mn-ea"/>
+                <a:cs typeface="+mn-cs"/>
+              </a:rPr>
+            </a:br>
+            <a:r>
+              <a:rPr lang="en-US" sz="1200" b="0" i="0" kern="1200" dirty="0" smtClean="0">
+                <a:solidFill>
+                  <a:schemeClr val="tx1"/>
+                </a:solidFill>
+                <a:latin typeface="+mn-lt"/>
+                <a:ea typeface="+mn-ea"/>
+                <a:cs typeface="+mn-cs"/>
+              </a:rPr>
+              <a:t>· Reformed Churches</a:t>
+            </a:r>
+            <a:br>
+              <a:rPr lang="en-US" sz="1200" b="0" i="0" kern="1200" dirty="0" smtClean="0">
+                <a:solidFill>
+                  <a:schemeClr val="tx1"/>
+                </a:solidFill>
+                <a:latin typeface="+mn-lt"/>
+                <a:ea typeface="+mn-ea"/>
+                <a:cs typeface="+mn-cs"/>
+              </a:rPr>
+            </a:br>
+            <a:r>
+              <a:rPr lang="en-US" sz="1200" b="0" i="0" kern="1200" dirty="0" smtClean="0">
+                <a:solidFill>
+                  <a:schemeClr val="tx1"/>
+                </a:solidFill>
+                <a:latin typeface="+mn-lt"/>
+                <a:ea typeface="+mn-ea"/>
+                <a:cs typeface="+mn-cs"/>
+              </a:rPr>
+              <a:t>· United Church of Christ</a:t>
+            </a:r>
+          </a:p>
+          <a:p>
             <a:endParaRPr lang="en-US" dirty="0"/>
           </a:p>
         </p:txBody>
@@ -3352,7 +4476,7 @@
             <a:fld id="{3A77AE25-6417-4A59-87AC-F0222D2B0C99}" type="datetimeFigureOut">
               <a:rPr lang="en-US" smtClean="0"/>
               <a:pPr/>
-              <a:t>6/4/2010</a:t>
+              <a:t>8/20/2010</a:t>
             </a:fld>
             <a:endParaRPr lang="en-US"/>
           </a:p>
@@ -3519,7 +4643,7 @@
             <a:fld id="{3A77AE25-6417-4A59-87AC-F0222D2B0C99}" type="datetimeFigureOut">
               <a:rPr lang="en-US" smtClean="0"/>
               <a:pPr/>
-              <a:t>6/4/2010</a:t>
+              <a:t>8/20/2010</a:t>
             </a:fld>
             <a:endParaRPr lang="en-US"/>
           </a:p>
@@ -3696,7 +4820,7 @@
             <a:fld id="{3A77AE25-6417-4A59-87AC-F0222D2B0C99}" type="datetimeFigureOut">
               <a:rPr lang="en-US" smtClean="0"/>
               <a:pPr/>
-              <a:t>6/4/2010</a:t>
+              <a:t>8/20/2010</a:t>
             </a:fld>
             <a:endParaRPr lang="en-US"/>
           </a:p>
@@ -3863,7 +4987,7 @@
             <a:fld id="{3A77AE25-6417-4A59-87AC-F0222D2B0C99}" type="datetimeFigureOut">
               <a:rPr lang="en-US" smtClean="0"/>
               <a:pPr/>
-              <a:t>6/4/2010</a:t>
+              <a:t>8/20/2010</a:t>
             </a:fld>
             <a:endParaRPr lang="en-US"/>
           </a:p>
@@ -4106,7 +5230,7 @@
             <a:fld id="{3A77AE25-6417-4A59-87AC-F0222D2B0C99}" type="datetimeFigureOut">
               <a:rPr lang="en-US" smtClean="0"/>
               <a:pPr/>
-              <a:t>6/4/2010</a:t>
+              <a:t>8/20/2010</a:t>
             </a:fld>
             <a:endParaRPr lang="en-US"/>
           </a:p>
@@ -4391,7 +5515,7 @@
             <a:fld id="{3A77AE25-6417-4A59-87AC-F0222D2B0C99}" type="datetimeFigureOut">
               <a:rPr lang="en-US" smtClean="0"/>
               <a:pPr/>
-              <a:t>6/4/2010</a:t>
+              <a:t>8/20/2010</a:t>
             </a:fld>
             <a:endParaRPr lang="en-US"/>
           </a:p>
@@ -4810,7 +5934,7 @@
             <a:fld id="{3A77AE25-6417-4A59-87AC-F0222D2B0C99}" type="datetimeFigureOut">
               <a:rPr lang="en-US" smtClean="0"/>
               <a:pPr/>
-              <a:t>6/4/2010</a:t>
+              <a:t>8/20/2010</a:t>
             </a:fld>
             <a:endParaRPr lang="en-US"/>
           </a:p>
@@ -4925,7 +6049,7 @@
             <a:fld id="{3A77AE25-6417-4A59-87AC-F0222D2B0C99}" type="datetimeFigureOut">
               <a:rPr lang="en-US" smtClean="0"/>
               <a:pPr/>
-              <a:t>6/4/2010</a:t>
+              <a:t>8/20/2010</a:t>
             </a:fld>
             <a:endParaRPr lang="en-US"/>
           </a:p>
@@ -5017,7 +6141,7 @@
             <a:fld id="{3A77AE25-6417-4A59-87AC-F0222D2B0C99}" type="datetimeFigureOut">
               <a:rPr lang="en-US" smtClean="0"/>
               <a:pPr/>
-              <a:t>6/4/2010</a:t>
+              <a:t>8/20/2010</a:t>
             </a:fld>
             <a:endParaRPr lang="en-US"/>
           </a:p>
@@ -5291,7 +6415,7 @@
             <a:fld id="{3A77AE25-6417-4A59-87AC-F0222D2B0C99}" type="datetimeFigureOut">
               <a:rPr lang="en-US" smtClean="0"/>
               <a:pPr/>
-              <a:t>6/4/2010</a:t>
+              <a:t>8/20/2010</a:t>
             </a:fld>
             <a:endParaRPr lang="en-US"/>
           </a:p>
@@ -5541,7 +6665,7 @@
             <a:fld id="{3A77AE25-6417-4A59-87AC-F0222D2B0C99}" type="datetimeFigureOut">
               <a:rPr lang="en-US" smtClean="0"/>
               <a:pPr/>
-              <a:t>6/4/2010</a:t>
+              <a:t>8/20/2010</a:t>
             </a:fld>
             <a:endParaRPr lang="en-US"/>
           </a:p>
@@ -5751,7 +6875,7 @@
             <a:fld id="{3A77AE25-6417-4A59-87AC-F0222D2B0C99}" type="datetimeFigureOut">
               <a:rPr lang="en-US" smtClean="0"/>
               <a:pPr/>
-              <a:t>6/4/2010</a:t>
+              <a:t>8/20/2010</a:t>
             </a:fld>
             <a:endParaRPr lang="en-US"/>
           </a:p>
@@ -6264,8 +7388,19 @@
           <a:p>
             <a:r>
               <a:rPr lang="en-US" dirty="0" smtClean="0"/>
-              <a:t>Outward Sign of Inward Grace</a:t>
-            </a:r>
+              <a:t>Outward Sign of Inward </a:t>
+            </a:r>
+            <a:r>
+              <a:rPr lang="en-US" dirty="0" smtClean="0"/>
+              <a:t>Grace</a:t>
+            </a:r>
+          </a:p>
+          <a:p>
+            <a:r>
+              <a:rPr lang="en-US" dirty="0" smtClean="0"/>
+              <a:t>Faith!</a:t>
+            </a:r>
+            <a:endParaRPr lang="en-US" dirty="0" smtClean="0"/>
           </a:p>
           <a:p>
             <a:r>
@@ -6366,8 +7501,8 @@
         </p:nvSpPr>
         <p:spPr>
           <a:xfrm>
-            <a:off x="457200" y="1600200"/>
-            <a:ext cx="8229600" cy="4800600"/>
+            <a:off x="457200" y="1295400"/>
+            <a:ext cx="8229600" cy="5105400"/>
           </a:xfrm>
         </p:spPr>
         <p:txBody>
@@ -6582,13 +7717,21 @@
           <a:p>
             <a:r>
               <a:rPr lang="en-US" dirty="0" smtClean="0"/>
-              <a:t>Born Infants (or the perpetually insane)</a:t>
-            </a:r>
-          </a:p>
-          <a:p>
-            <a:r>
-              <a:rPr lang="en-US" dirty="0" smtClean="0"/>
-              <a:t>Partially born or in </a:t>
+              <a:t>Born Infants (or </a:t>
+            </a:r>
+            <a:r>
+              <a:rPr lang="en-US" dirty="0" smtClean="0"/>
+              <a:t>those with permanent </a:t>
+            </a:r>
+            <a:r>
+              <a:rPr lang="en-US" dirty="0" smtClean="0"/>
+              <a:t>mental impairment)</a:t>
+            </a:r>
+          </a:p>
+          <a:p>
+            <a:r>
+              <a:rPr lang="en-US" dirty="0" smtClean="0"/>
+              <a:t>Partially born or in-</a:t>
             </a:r>
             <a:r>
               <a:rPr lang="en-US" dirty="0" err="1" smtClean="0"/>
@@ -8703,11 +9846,7 @@
           <a:p>
             <a:r>
               <a:rPr lang="en-US" dirty="0" smtClean="0"/>
-              <a:t>Anointing: </a:t>
-            </a:r>
-            <a:r>
-              <a:rPr lang="en-US" dirty="0" smtClean="0"/>
-              <a:t>King</a:t>
+              <a:t>Anointing: King</a:t>
             </a:r>
             <a:endParaRPr lang="en-US" dirty="0"/>
           </a:p>
@@ -10253,14 +11392,19 @@
         </p:spPr>
         <p:txBody>
           <a:bodyPr>
-            <a:normAutofit/>
+            <a:normAutofit lnSpcReduction="10000"/>
           </a:bodyPr>
           <a:lstStyle/>
           <a:p>
             <a:r>
               <a:rPr lang="en-US" dirty="0" smtClean="0"/>
-              <a:t>Prefigured in Old Testament (Creation, Exodus, Deluge)</a:t>
-            </a:r>
+              <a:t>Prefigured in Old Testament (Creation, Exodus, </a:t>
+            </a:r>
+            <a:r>
+              <a:rPr lang="en-US" dirty="0" smtClean="0"/>
+              <a:t>Deluge -- 1 Peter 3:20-21)</a:t>
+            </a:r>
+            <a:endParaRPr lang="en-US" dirty="0" smtClean="0"/>
           </a:p>
           <a:p>
             <a:r>
@@ -10276,13 +11420,26 @@
           <a:p>
             <a:r>
               <a:rPr lang="en-US" dirty="0" smtClean="0"/>
-              <a:t>Saving grace, removes Original Sin</a:t>
-            </a:r>
-          </a:p>
-          <a:p>
-            <a:r>
-              <a:rPr lang="en-US" dirty="0" smtClean="0"/>
-              <a:t>Necessary for Salvation (John 3):</a:t>
+              <a:t>Saving grace, removes Original </a:t>
+            </a:r>
+            <a:r>
+              <a:rPr lang="en-US" dirty="0" smtClean="0"/>
+              <a:t>Sin – not a just a symbol, it has REAL power (Mark 5:27-34)</a:t>
+            </a:r>
+            <a:endParaRPr lang="en-US" dirty="0" smtClean="0"/>
+          </a:p>
+          <a:p>
+            <a:r>
+              <a:rPr lang="en-US" dirty="0" smtClean="0"/>
+              <a:t>Necessary for Salvation </a:t>
+            </a:r>
+            <a:r>
+              <a:rPr lang="en-US" dirty="0" smtClean="0"/>
+              <a:t>(1 Pt 3:21, John </a:t>
+            </a:r>
+            <a:r>
+              <a:rPr lang="en-US" dirty="0" smtClean="0"/>
+              <a:t>3):</a:t>
             </a:r>
           </a:p>
           <a:p>
@@ -10298,13 +11455,8 @@
             </a:pPr>
             <a:r>
               <a:rPr lang="en-US" sz="2000" dirty="0" smtClean="0"/>
-              <a:t>(CCC 1257 – Necessity </a:t>
-            </a:r>
-            <a:r>
-              <a:rPr lang="en-US" sz="2000" smtClean="0"/>
-              <a:t>of Baptism)</a:t>
-            </a:r>
-            <a:endParaRPr lang="en-US" sz="2000" dirty="0" smtClean="0"/>
+              <a:t>(CCC 1257 – Necessity of Baptism)</a:t>
+            </a:r>
           </a:p>
           <a:p>
             <a:endParaRPr lang="en-US" dirty="0"/>

</xml_diff>

<commit_message>
Changed order of OT prefigurements to be chronological. Added 'Intention' as a necessary aspect of performing a sacrament
</commit_message>
<xml_diff>
--- a/baptismclass/Baptism.pptx
+++ b/baptismclass/Baptism.pptx
@@ -238,7 +238,7 @@
             <a:fld id="{7946C2C9-FAA8-4628-B554-BFB35601F267}" type="datetimeFigureOut">
               <a:rPr lang="en-US" smtClean="0"/>
               <a:pPr/>
-              <a:t>8/20/2010</a:t>
+              <a:t>2/4/2011</a:t>
             </a:fld>
             <a:endParaRPr lang="en-US"/>
           </a:p>
@@ -592,18 +592,7 @@
                 <a:ea typeface="+mn-ea"/>
                 <a:cs typeface="+mn-cs"/>
               </a:rPr>
-              <a:t> 16:15-16</a:t>
-            </a:r>
-            <a:r>
-              <a:rPr lang="en-US" sz="1200" b="0" i="0" kern="1200" dirty="0" smtClean="0">
-                <a:solidFill>
-                  <a:schemeClr val="tx1"/>
-                </a:solidFill>
-                <a:latin typeface="+mn-lt"/>
-                <a:ea typeface="+mn-ea"/>
-                <a:cs typeface="+mn-cs"/>
-              </a:rPr>
-              <a:t>.</a:t>
+              <a:t> 16:15-16.</a:t>
             </a:r>
           </a:p>
           <a:p>
@@ -4476,7 +4465,7 @@
             <a:fld id="{3A77AE25-6417-4A59-87AC-F0222D2B0C99}" type="datetimeFigureOut">
               <a:rPr lang="en-US" smtClean="0"/>
               <a:pPr/>
-              <a:t>8/20/2010</a:t>
+              <a:t>2/4/2011</a:t>
             </a:fld>
             <a:endParaRPr lang="en-US"/>
           </a:p>
@@ -4643,7 +4632,7 @@
             <a:fld id="{3A77AE25-6417-4A59-87AC-F0222D2B0C99}" type="datetimeFigureOut">
               <a:rPr lang="en-US" smtClean="0"/>
               <a:pPr/>
-              <a:t>8/20/2010</a:t>
+              <a:t>2/4/2011</a:t>
             </a:fld>
             <a:endParaRPr lang="en-US"/>
           </a:p>
@@ -4820,7 +4809,7 @@
             <a:fld id="{3A77AE25-6417-4A59-87AC-F0222D2B0C99}" type="datetimeFigureOut">
               <a:rPr lang="en-US" smtClean="0"/>
               <a:pPr/>
-              <a:t>8/20/2010</a:t>
+              <a:t>2/4/2011</a:t>
             </a:fld>
             <a:endParaRPr lang="en-US"/>
           </a:p>
@@ -4987,7 +4976,7 @@
             <a:fld id="{3A77AE25-6417-4A59-87AC-F0222D2B0C99}" type="datetimeFigureOut">
               <a:rPr lang="en-US" smtClean="0"/>
               <a:pPr/>
-              <a:t>8/20/2010</a:t>
+              <a:t>2/4/2011</a:t>
             </a:fld>
             <a:endParaRPr lang="en-US"/>
           </a:p>
@@ -5230,7 +5219,7 @@
             <a:fld id="{3A77AE25-6417-4A59-87AC-F0222D2B0C99}" type="datetimeFigureOut">
               <a:rPr lang="en-US" smtClean="0"/>
               <a:pPr/>
-              <a:t>8/20/2010</a:t>
+              <a:t>2/4/2011</a:t>
             </a:fld>
             <a:endParaRPr lang="en-US"/>
           </a:p>
@@ -5515,7 +5504,7 @@
             <a:fld id="{3A77AE25-6417-4A59-87AC-F0222D2B0C99}" type="datetimeFigureOut">
               <a:rPr lang="en-US" smtClean="0"/>
               <a:pPr/>
-              <a:t>8/20/2010</a:t>
+              <a:t>2/4/2011</a:t>
             </a:fld>
             <a:endParaRPr lang="en-US"/>
           </a:p>
@@ -5934,7 +5923,7 @@
             <a:fld id="{3A77AE25-6417-4A59-87AC-F0222D2B0C99}" type="datetimeFigureOut">
               <a:rPr lang="en-US" smtClean="0"/>
               <a:pPr/>
-              <a:t>8/20/2010</a:t>
+              <a:t>2/4/2011</a:t>
             </a:fld>
             <a:endParaRPr lang="en-US"/>
           </a:p>
@@ -6049,7 +6038,7 @@
             <a:fld id="{3A77AE25-6417-4A59-87AC-F0222D2B0C99}" type="datetimeFigureOut">
               <a:rPr lang="en-US" smtClean="0"/>
               <a:pPr/>
-              <a:t>8/20/2010</a:t>
+              <a:t>2/4/2011</a:t>
             </a:fld>
             <a:endParaRPr lang="en-US"/>
           </a:p>
@@ -6141,7 +6130,7 @@
             <a:fld id="{3A77AE25-6417-4A59-87AC-F0222D2B0C99}" type="datetimeFigureOut">
               <a:rPr lang="en-US" smtClean="0"/>
               <a:pPr/>
-              <a:t>8/20/2010</a:t>
+              <a:t>2/4/2011</a:t>
             </a:fld>
             <a:endParaRPr lang="en-US"/>
           </a:p>
@@ -6415,7 +6404,7 @@
             <a:fld id="{3A77AE25-6417-4A59-87AC-F0222D2B0C99}" type="datetimeFigureOut">
               <a:rPr lang="en-US" smtClean="0"/>
               <a:pPr/>
-              <a:t>8/20/2010</a:t>
+              <a:t>2/4/2011</a:t>
             </a:fld>
             <a:endParaRPr lang="en-US"/>
           </a:p>
@@ -6665,7 +6654,7 @@
             <a:fld id="{3A77AE25-6417-4A59-87AC-F0222D2B0C99}" type="datetimeFigureOut">
               <a:rPr lang="en-US" smtClean="0"/>
               <a:pPr/>
-              <a:t>8/20/2010</a:t>
+              <a:t>2/4/2011</a:t>
             </a:fld>
             <a:endParaRPr lang="en-US"/>
           </a:p>
@@ -6875,7 +6864,7 @@
             <a:fld id="{3A77AE25-6417-4A59-87AC-F0222D2B0C99}" type="datetimeFigureOut">
               <a:rPr lang="en-US" smtClean="0"/>
               <a:pPr/>
-              <a:t>8/20/2010</a:t>
+              <a:t>2/4/2011</a:t>
             </a:fld>
             <a:endParaRPr lang="en-US"/>
           </a:p>
@@ -7381,18 +7370,21 @@
             <p:ph idx="1"/>
           </p:nvPr>
         </p:nvSpPr>
-        <p:spPr/>
-        <p:txBody>
-          <a:bodyPr/>
-          <a:lstStyle/>
-          <a:p>
-            <a:r>
-              <a:rPr lang="en-US" dirty="0" smtClean="0"/>
-              <a:t>Outward Sign of Inward </a:t>
-            </a:r>
-            <a:r>
-              <a:rPr lang="en-US" dirty="0" smtClean="0"/>
-              <a:t>Grace</a:t>
+        <p:spPr>
+          <a:xfrm>
+            <a:off x="457200" y="1600200"/>
+            <a:ext cx="8229600" cy="4876800"/>
+          </a:xfrm>
+        </p:spPr>
+        <p:txBody>
+          <a:bodyPr>
+            <a:normAutofit/>
+          </a:bodyPr>
+          <a:lstStyle/>
+          <a:p>
+            <a:r>
+              <a:rPr lang="en-US" dirty="0" smtClean="0"/>
+              <a:t>Outward Sign of Inward Grace</a:t>
             </a:r>
           </a:p>
           <a:p>
@@ -7400,37 +7392,43 @@
               <a:rPr lang="en-US" dirty="0" smtClean="0"/>
               <a:t>Faith!</a:t>
             </a:r>
+          </a:p>
+          <a:p>
+            <a:r>
+              <a:rPr lang="en-US" dirty="0" smtClean="0"/>
+              <a:t>Indelible Mark</a:t>
+            </a:r>
+          </a:p>
+          <a:p>
+            <a:r>
+              <a:rPr lang="en-US" dirty="0" smtClean="0"/>
+              <a:t>Minister</a:t>
+            </a:r>
+          </a:p>
+          <a:p>
+            <a:r>
+              <a:rPr lang="en-US" dirty="0" smtClean="0"/>
+              <a:t>Matter</a:t>
+            </a:r>
+          </a:p>
+          <a:p>
+            <a:r>
+              <a:rPr lang="en-US" dirty="0" smtClean="0"/>
+              <a:t>Form</a:t>
+            </a:r>
+          </a:p>
+          <a:p>
+            <a:r>
+              <a:rPr lang="en-US" dirty="0" smtClean="0"/>
+              <a:t>Effects</a:t>
+            </a:r>
+          </a:p>
+          <a:p>
+            <a:r>
+              <a:rPr lang="en-US" dirty="0" smtClean="0"/>
+              <a:t>Intention</a:t>
+            </a:r>
             <a:endParaRPr lang="en-US" dirty="0" smtClean="0"/>
-          </a:p>
-          <a:p>
-            <a:r>
-              <a:rPr lang="en-US" dirty="0" smtClean="0"/>
-              <a:t>Indelible Mark</a:t>
-            </a:r>
-          </a:p>
-          <a:p>
-            <a:r>
-              <a:rPr lang="en-US" dirty="0" smtClean="0"/>
-              <a:t>Minister</a:t>
-            </a:r>
-          </a:p>
-          <a:p>
-            <a:r>
-              <a:rPr lang="en-US" dirty="0" smtClean="0"/>
-              <a:t>Matter</a:t>
-            </a:r>
-          </a:p>
-          <a:p>
-            <a:r>
-              <a:rPr lang="en-US" dirty="0" smtClean="0"/>
-              <a:t>Form</a:t>
-            </a:r>
-          </a:p>
-          <a:p>
-            <a:r>
-              <a:rPr lang="en-US" dirty="0" smtClean="0"/>
-              <a:t>Effects</a:t>
-            </a:r>
           </a:p>
         </p:txBody>
       </p:sp>
@@ -7717,15 +7715,7 @@
           <a:p>
             <a:r>
               <a:rPr lang="en-US" dirty="0" smtClean="0"/>
-              <a:t>Born Infants (or </a:t>
-            </a:r>
-            <a:r>
-              <a:rPr lang="en-US" dirty="0" smtClean="0"/>
-              <a:t>those with permanent </a:t>
-            </a:r>
-            <a:r>
-              <a:rPr lang="en-US" dirty="0" smtClean="0"/>
-              <a:t>mental impairment)</a:t>
+              <a:t>Born Infants (or those with permanent mental impairment)</a:t>
             </a:r>
           </a:p>
           <a:p>
@@ -11398,13 +11388,16 @@
           <a:p>
             <a:r>
               <a:rPr lang="en-US" dirty="0" smtClean="0"/>
-              <a:t>Prefigured in Old Testament (Creation, Exodus, </a:t>
-            </a:r>
-            <a:r>
-              <a:rPr lang="en-US" dirty="0" smtClean="0"/>
-              <a:t>Deluge -- 1 Peter 3:20-21)</a:t>
-            </a:r>
-            <a:endParaRPr lang="en-US" dirty="0" smtClean="0"/>
+              <a:t>Prefigured in Old Testament (Creation, </a:t>
+            </a:r>
+            <a:r>
+              <a:rPr lang="en-US" dirty="0" smtClean="0"/>
+              <a:t>Deluge, Exodus </a:t>
+            </a:r>
+            <a:r>
+              <a:rPr lang="en-US" dirty="0" smtClean="0"/>
+              <a:t>-- 1 Peter 3:20-21)</a:t>
+            </a:r>
           </a:p>
           <a:p>
             <a:r>
@@ -11420,26 +11413,13 @@
           <a:p>
             <a:r>
               <a:rPr lang="en-US" dirty="0" smtClean="0"/>
-              <a:t>Saving grace, removes Original </a:t>
-            </a:r>
-            <a:r>
-              <a:rPr lang="en-US" dirty="0" smtClean="0"/>
-              <a:t>Sin – not a just a symbol, it has REAL power (Mark 5:27-34)</a:t>
-            </a:r>
-            <a:endParaRPr lang="en-US" dirty="0" smtClean="0"/>
-          </a:p>
-          <a:p>
-            <a:r>
-              <a:rPr lang="en-US" dirty="0" smtClean="0"/>
-              <a:t>Necessary for Salvation </a:t>
-            </a:r>
-            <a:r>
-              <a:rPr lang="en-US" dirty="0" smtClean="0"/>
-              <a:t>(1 Pt 3:21, John </a:t>
-            </a:r>
-            <a:r>
-              <a:rPr lang="en-US" dirty="0" smtClean="0"/>
-              <a:t>3):</a:t>
+              <a:t>Saving grace, removes Original Sin – not a just a symbol, it has REAL power (Mark 5:27-34)</a:t>
+            </a:r>
+          </a:p>
+          <a:p>
+            <a:r>
+              <a:rPr lang="en-US" dirty="0" smtClean="0"/>
+              <a:t>Necessary for Salvation (1 Pt 3:21, John 3):</a:t>
             </a:r>
           </a:p>
           <a:p>

</xml_diff>